<commit_message>
add lesson Nov 5
</commit_message>
<xml_diff>
--- a/lessons/7_Oct29_TimeSeries_Equities/Oct_29_TimeSeries.pptx
+++ b/lessons/7_Oct29_TimeSeries_Equities/Oct_29_TimeSeries.pptx
@@ -247,7 +247,7 @@
           <a:p>
             <a:fld id="{C333ABA6-B72D-4ED4-A6E7-13A0DAE65F1A}" type="datetimeFigureOut">
               <a:rPr lang="en-US" smtClean="0"/>
-              <a:t>10/28/2018</a:t>
+              <a:t>10/29/2018</a:t>
             </a:fld>
             <a:endParaRPr lang="en-US"/>
           </a:p>
@@ -1359,7 +1359,7 @@
           <a:p>
             <a:fld id="{5738B90E-0779-4C36-915C-6F05FCD89456}" type="datetime1">
               <a:rPr lang="en-US" smtClean="0"/>
-              <a:t>10/28/2018</a:t>
+              <a:t>10/29/2018</a:t>
             </a:fld>
             <a:endParaRPr lang="en-US"/>
           </a:p>
@@ -1577,7 +1577,7 @@
           <a:p>
             <a:fld id="{7B9EA29D-D431-42FE-B7B6-AAE4454C77D3}" type="datetime1">
               <a:rPr lang="en-US" smtClean="0"/>
-              <a:t>10/28/2018</a:t>
+              <a:t>10/29/2018</a:t>
             </a:fld>
             <a:endParaRPr lang="en-US"/>
           </a:p>
@@ -1837,7 +1837,7 @@
           <a:p>
             <a:fld id="{690D8A1E-EA8F-46C1-B891-AE0C00D9C314}" type="datetime1">
               <a:rPr lang="en-US" smtClean="0"/>
-              <a:t>10/28/2018</a:t>
+              <a:t>10/29/2018</a:t>
             </a:fld>
             <a:endParaRPr lang="en-US"/>
           </a:p>
@@ -2131,7 +2131,7 @@
           <a:p>
             <a:fld id="{D753EFC8-4232-4598-94F6-94C0EBAFC469}" type="datetime1">
               <a:rPr lang="en-US" smtClean="0"/>
-              <a:t>10/28/2018</a:t>
+              <a:t>10/29/2018</a:t>
             </a:fld>
             <a:endParaRPr lang="en-US"/>
           </a:p>
@@ -2446,7 +2446,7 @@
           <a:p>
             <a:fld id="{F3161074-1C18-4AE7-957D-F18524378C85}" type="datetime1">
               <a:rPr lang="en-US" smtClean="0"/>
-              <a:t>10/28/2018</a:t>
+              <a:t>10/29/2018</a:t>
             </a:fld>
             <a:endParaRPr lang="en-US"/>
           </a:p>
@@ -2720,7 +2720,7 @@
           <a:p>
             <a:fld id="{69BE256C-8D9A-4404-B47D-41A1AE514425}" type="datetime1">
               <a:rPr lang="en-US" smtClean="0"/>
-              <a:t>10/28/2018</a:t>
+              <a:t>10/29/2018</a:t>
             </a:fld>
             <a:endParaRPr lang="en-US"/>
           </a:p>
@@ -3154,7 +3154,7 @@
           <a:p>
             <a:fld id="{66CB2154-9035-4012-8189-BAAB61C5A5EE}" type="datetime1">
               <a:rPr lang="en-US" smtClean="0"/>
-              <a:t>10/28/2018</a:t>
+              <a:t>10/29/2018</a:t>
             </a:fld>
             <a:endParaRPr lang="en-US"/>
           </a:p>
@@ -3328,7 +3328,7 @@
           <a:p>
             <a:fld id="{6700A58B-DD98-43D0-B791-721480A02982}" type="datetime1">
               <a:rPr lang="en-US" smtClean="0"/>
-              <a:t>10/28/2018</a:t>
+              <a:t>10/29/2018</a:t>
             </a:fld>
             <a:endParaRPr lang="en-US"/>
           </a:p>
@@ -3520,7 +3520,7 @@
           <a:p>
             <a:fld id="{7DB6E382-4F61-4E24-BE1A-377EC83D0E3A}" type="datetime1">
               <a:rPr lang="en-US" smtClean="0"/>
-              <a:t>10/28/2018</a:t>
+              <a:t>10/29/2018</a:t>
             </a:fld>
             <a:endParaRPr lang="en-US"/>
           </a:p>
@@ -3831,7 +3831,7 @@
           <a:p>
             <a:fld id="{4142EED6-FC16-45B9-B8C4-2BC5DBA88325}" type="datetime1">
               <a:rPr lang="en-US" smtClean="0"/>
-              <a:t>10/28/2018</a:t>
+              <a:t>10/29/2018</a:t>
             </a:fld>
             <a:endParaRPr lang="en-US"/>
           </a:p>
@@ -4149,7 +4149,7 @@
           <a:p>
             <a:fld id="{DF59512B-4F1D-43D7-8819-2F53FEF69650}" type="datetime1">
               <a:rPr lang="en-US" smtClean="0"/>
-              <a:t>10/28/2018</a:t>
+              <a:t>10/29/2018</a:t>
             </a:fld>
             <a:endParaRPr lang="en-US"/>
           </a:p>
@@ -4425,7 +4425,7 @@
           <a:p>
             <a:fld id="{08437B94-E2BF-44DC-ADC5-B05FC9934E9D}" type="datetime1">
               <a:rPr lang="en-US" smtClean="0"/>
-              <a:t>10/28/2018</a:t>
+              <a:t>10/29/2018</a:t>
             </a:fld>
             <a:endParaRPr lang="en-US"/>
           </a:p>
@@ -4874,7 +4874,7 @@
           <p:cNvPr id="2" name="Title 1">
             <a:extLst>
               <a:ext uri="{FF2B5EF4-FFF2-40B4-BE49-F238E27FC236}">
-                <a16:creationId xmlns="" xmlns:a16="http://schemas.microsoft.com/office/drawing/2014/main" id="{223FF278-3A5B-44F8-9DCA-4293CA7C44DD}"/>
+                <a16:creationId xmlns:a16="http://schemas.microsoft.com/office/drawing/2014/main" xmlns="" id="{223FF278-3A5B-44F8-9DCA-4293CA7C44DD}"/>
               </a:ext>
             </a:extLst>
           </p:cNvPr>
@@ -4902,7 +4902,7 @@
           <p:cNvPr id="3" name="Text Placeholder 2">
             <a:extLst>
               <a:ext uri="{FF2B5EF4-FFF2-40B4-BE49-F238E27FC236}">
-                <a16:creationId xmlns="" xmlns:a16="http://schemas.microsoft.com/office/drawing/2014/main" id="{0BA52E92-473C-4CB8-998E-1DCAAAC10785}"/>
+                <a16:creationId xmlns:a16="http://schemas.microsoft.com/office/drawing/2014/main" xmlns="" id="{0BA52E92-473C-4CB8-998E-1DCAAAC10785}"/>
               </a:ext>
             </a:extLst>
           </p:cNvPr>
@@ -4927,7 +4927,7 @@
           <p:cNvPr id="4" name="Date Placeholder 3">
             <a:extLst>
               <a:ext uri="{FF2B5EF4-FFF2-40B4-BE49-F238E27FC236}">
-                <a16:creationId xmlns="" xmlns:a16="http://schemas.microsoft.com/office/drawing/2014/main" id="{C1BFFD1B-D36D-40D0-A49A-3132AB756CCB}"/>
+                <a16:creationId xmlns:a16="http://schemas.microsoft.com/office/drawing/2014/main" xmlns="" id="{C1BFFD1B-D36D-40D0-A49A-3132AB756CCB}"/>
               </a:ext>
             </a:extLst>
           </p:cNvPr>
@@ -4945,7 +4945,7 @@
           <a:p>
             <a:fld id="{F3161074-1C18-4AE7-957D-F18524378C85}" type="datetime1">
               <a:rPr lang="en-US" smtClean="0"/>
-              <a:t>10/28/2018</a:t>
+              <a:t>10/29/2018</a:t>
             </a:fld>
             <a:endParaRPr lang="en-US"/>
           </a:p>
@@ -4956,7 +4956,7 @@
           <p:cNvPr id="5" name="Slide Number Placeholder 4">
             <a:extLst>
               <a:ext uri="{FF2B5EF4-FFF2-40B4-BE49-F238E27FC236}">
-                <a16:creationId xmlns="" xmlns:a16="http://schemas.microsoft.com/office/drawing/2014/main" id="{0C8E71AB-0020-4F74-93A4-9D0EA5788AC5}"/>
+                <a16:creationId xmlns:a16="http://schemas.microsoft.com/office/drawing/2014/main" xmlns="" id="{0C8E71AB-0020-4F74-93A4-9D0EA5788AC5}"/>
               </a:ext>
             </a:extLst>
           </p:cNvPr>
@@ -4985,7 +4985,7 @@
           <p:cNvPr id="6" name="Footer Placeholder 5">
             <a:extLst>
               <a:ext uri="{FF2B5EF4-FFF2-40B4-BE49-F238E27FC236}">
-                <a16:creationId xmlns="" xmlns:a16="http://schemas.microsoft.com/office/drawing/2014/main" id="{E05FF79E-1D78-423E-BA08-2C16C5541A5A}"/>
+                <a16:creationId xmlns:a16="http://schemas.microsoft.com/office/drawing/2014/main" xmlns="" id="{E05FF79E-1D78-423E-BA08-2C16C5541A5A}"/>
               </a:ext>
             </a:extLst>
           </p:cNvPr>
@@ -5026,6 +5026,13 @@
   <p:clrMapOvr>
     <a:masterClrMapping/>
   </p:clrMapOvr>
+  <p:timing>
+    <p:tnLst>
+      <p:par>
+        <p:cTn id="1" dur="indefinite" restart="never" nodeType="tmRoot"/>
+      </p:par>
+    </p:tnLst>
+  </p:timing>
 </p:sld>
 </file>
 
@@ -5051,7 +5058,7 @@
           <p:cNvPr id="2" name="Date Placeholder 1">
             <a:extLst>
               <a:ext uri="{FF2B5EF4-FFF2-40B4-BE49-F238E27FC236}">
-                <a16:creationId xmlns="" xmlns:a16="http://schemas.microsoft.com/office/drawing/2014/main" id="{1446CF81-18DA-4882-8542-7FA528C6881D}"/>
+                <a16:creationId xmlns:a16="http://schemas.microsoft.com/office/drawing/2014/main" xmlns="" id="{1446CF81-18DA-4882-8542-7FA528C6881D}"/>
               </a:ext>
             </a:extLst>
           </p:cNvPr>
@@ -5069,7 +5076,7 @@
           <a:p>
             <a:fld id="{6700A58B-DD98-43D0-B791-721480A02982}" type="datetime1">
               <a:rPr lang="en-US" smtClean="0"/>
-              <a:t>10/28/2018</a:t>
+              <a:t>10/29/2018</a:t>
             </a:fld>
             <a:endParaRPr lang="en-US"/>
           </a:p>
@@ -5080,7 +5087,7 @@
           <p:cNvPr id="3" name="Title 2">
             <a:extLst>
               <a:ext uri="{FF2B5EF4-FFF2-40B4-BE49-F238E27FC236}">
-                <a16:creationId xmlns="" xmlns:a16="http://schemas.microsoft.com/office/drawing/2014/main" id="{614E3173-1F1E-4CF3-A763-737C0F4A4EA7}"/>
+                <a16:creationId xmlns:a16="http://schemas.microsoft.com/office/drawing/2014/main" xmlns="" id="{614E3173-1F1E-4CF3-A763-737C0F4A4EA7}"/>
               </a:ext>
             </a:extLst>
           </p:cNvPr>
@@ -5108,7 +5115,7 @@
           <p:cNvPr id="4" name="Slide Number Placeholder 3">
             <a:extLst>
               <a:ext uri="{FF2B5EF4-FFF2-40B4-BE49-F238E27FC236}">
-                <a16:creationId xmlns="" xmlns:a16="http://schemas.microsoft.com/office/drawing/2014/main" id="{C84D43DA-DA54-4A2F-AFA1-93EE114DE9F2}"/>
+                <a16:creationId xmlns:a16="http://schemas.microsoft.com/office/drawing/2014/main" xmlns="" id="{C84D43DA-DA54-4A2F-AFA1-93EE114DE9F2}"/>
               </a:ext>
             </a:extLst>
           </p:cNvPr>
@@ -5137,7 +5144,7 @@
           <p:cNvPr id="5" name="Footer Placeholder 4">
             <a:extLst>
               <a:ext uri="{FF2B5EF4-FFF2-40B4-BE49-F238E27FC236}">
-                <a16:creationId xmlns="" xmlns:a16="http://schemas.microsoft.com/office/drawing/2014/main" id="{EE31643D-3082-4F21-9828-946838B0DBFB}"/>
+                <a16:creationId xmlns:a16="http://schemas.microsoft.com/office/drawing/2014/main" xmlns="" id="{EE31643D-3082-4F21-9828-946838B0DBFB}"/>
               </a:ext>
             </a:extLst>
           </p:cNvPr>
@@ -5166,7 +5173,7 @@
           <p:cNvPr id="7" name="TextBox 6">
             <a:extLst>
               <a:ext uri="{FF2B5EF4-FFF2-40B4-BE49-F238E27FC236}">
-                <a16:creationId xmlns="" xmlns:a16="http://schemas.microsoft.com/office/drawing/2014/main" id="{709878E9-7B9E-4E44-B365-5CC9BC94906B}"/>
+                <a16:creationId xmlns:a16="http://schemas.microsoft.com/office/drawing/2014/main" xmlns="" id="{709878E9-7B9E-4E44-B365-5CC9BC94906B}"/>
               </a:ext>
             </a:extLst>
           </p:cNvPr>
@@ -5225,7 +5232,7 @@
           <p:cNvPr id="6" name="Picture 5">
             <a:extLst>
               <a:ext uri="{FF2B5EF4-FFF2-40B4-BE49-F238E27FC236}">
-                <a16:creationId xmlns="" xmlns:a16="http://schemas.microsoft.com/office/drawing/2014/main" id="{4D9F30B6-F781-4F9F-A682-E0BD1E45FE16}"/>
+                <a16:creationId xmlns:a16="http://schemas.microsoft.com/office/drawing/2014/main" xmlns="" id="{4D9F30B6-F781-4F9F-A682-E0BD1E45FE16}"/>
               </a:ext>
             </a:extLst>
           </p:cNvPr>
@@ -5260,6 +5267,13 @@
   <p:clrMapOvr>
     <a:masterClrMapping/>
   </p:clrMapOvr>
+  <p:timing>
+    <p:tnLst>
+      <p:par>
+        <p:cTn id="1" dur="indefinite" restart="never" nodeType="tmRoot"/>
+      </p:par>
+    </p:tnLst>
+  </p:timing>
 </p:sld>
 </file>
 
@@ -5285,7 +5299,7 @@
           <p:cNvPr id="2" name="Date Placeholder 1">
             <a:extLst>
               <a:ext uri="{FF2B5EF4-FFF2-40B4-BE49-F238E27FC236}">
-                <a16:creationId xmlns="" xmlns:a16="http://schemas.microsoft.com/office/drawing/2014/main" id="{1446CF81-18DA-4882-8542-7FA528C6881D}"/>
+                <a16:creationId xmlns:a16="http://schemas.microsoft.com/office/drawing/2014/main" xmlns="" id="{1446CF81-18DA-4882-8542-7FA528C6881D}"/>
               </a:ext>
             </a:extLst>
           </p:cNvPr>
@@ -5303,7 +5317,7 @@
           <a:p>
             <a:fld id="{6700A58B-DD98-43D0-B791-721480A02982}" type="datetime1">
               <a:rPr lang="en-US" smtClean="0"/>
-              <a:t>10/28/2018</a:t>
+              <a:t>10/29/2018</a:t>
             </a:fld>
             <a:endParaRPr lang="en-US"/>
           </a:p>
@@ -5314,7 +5328,7 @@
           <p:cNvPr id="3" name="Title 2">
             <a:extLst>
               <a:ext uri="{FF2B5EF4-FFF2-40B4-BE49-F238E27FC236}">
-                <a16:creationId xmlns="" xmlns:a16="http://schemas.microsoft.com/office/drawing/2014/main" id="{614E3173-1F1E-4CF3-A763-737C0F4A4EA7}"/>
+                <a16:creationId xmlns:a16="http://schemas.microsoft.com/office/drawing/2014/main" xmlns="" id="{614E3173-1F1E-4CF3-A763-737C0F4A4EA7}"/>
               </a:ext>
             </a:extLst>
           </p:cNvPr>
@@ -5342,7 +5356,7 @@
           <p:cNvPr id="4" name="Slide Number Placeholder 3">
             <a:extLst>
               <a:ext uri="{FF2B5EF4-FFF2-40B4-BE49-F238E27FC236}">
-                <a16:creationId xmlns="" xmlns:a16="http://schemas.microsoft.com/office/drawing/2014/main" id="{C84D43DA-DA54-4A2F-AFA1-93EE114DE9F2}"/>
+                <a16:creationId xmlns:a16="http://schemas.microsoft.com/office/drawing/2014/main" xmlns="" id="{C84D43DA-DA54-4A2F-AFA1-93EE114DE9F2}"/>
               </a:ext>
             </a:extLst>
           </p:cNvPr>
@@ -5371,7 +5385,7 @@
           <p:cNvPr id="5" name="Footer Placeholder 4">
             <a:extLst>
               <a:ext uri="{FF2B5EF4-FFF2-40B4-BE49-F238E27FC236}">
-                <a16:creationId xmlns="" xmlns:a16="http://schemas.microsoft.com/office/drawing/2014/main" id="{EE31643D-3082-4F21-9828-946838B0DBFB}"/>
+                <a16:creationId xmlns:a16="http://schemas.microsoft.com/office/drawing/2014/main" xmlns="" id="{EE31643D-3082-4F21-9828-946838B0DBFB}"/>
               </a:ext>
             </a:extLst>
           </p:cNvPr>
@@ -5400,7 +5414,7 @@
           <p:cNvPr id="7" name="TextBox 6">
             <a:extLst>
               <a:ext uri="{FF2B5EF4-FFF2-40B4-BE49-F238E27FC236}">
-                <a16:creationId xmlns="" xmlns:a16="http://schemas.microsoft.com/office/drawing/2014/main" id="{709878E9-7B9E-4E44-B365-5CC9BC94906B}"/>
+                <a16:creationId xmlns:a16="http://schemas.microsoft.com/office/drawing/2014/main" xmlns="" id="{709878E9-7B9E-4E44-B365-5CC9BC94906B}"/>
               </a:ext>
             </a:extLst>
           </p:cNvPr>
@@ -5467,7 +5481,7 @@
           <p:cNvPr id="8" name="Picture 7">
             <a:extLst>
               <a:ext uri="{FF2B5EF4-FFF2-40B4-BE49-F238E27FC236}">
-                <a16:creationId xmlns="" xmlns:a16="http://schemas.microsoft.com/office/drawing/2014/main" id="{99079329-3AED-4937-A9A0-10ED9AC598A6}"/>
+                <a16:creationId xmlns:a16="http://schemas.microsoft.com/office/drawing/2014/main" xmlns="" id="{99079329-3AED-4937-A9A0-10ED9AC598A6}"/>
               </a:ext>
             </a:extLst>
           </p:cNvPr>
@@ -5501,6 +5515,13 @@
   <p:clrMapOvr>
     <a:masterClrMapping/>
   </p:clrMapOvr>
+  <p:timing>
+    <p:tnLst>
+      <p:par>
+        <p:cTn id="1" dur="indefinite" restart="never" nodeType="tmRoot"/>
+      </p:par>
+    </p:tnLst>
+  </p:timing>
 </p:sld>
 </file>
 
@@ -5526,7 +5547,7 @@
           <p:cNvPr id="2" name="Date Placeholder 1">
             <a:extLst>
               <a:ext uri="{FF2B5EF4-FFF2-40B4-BE49-F238E27FC236}">
-                <a16:creationId xmlns="" xmlns:a16="http://schemas.microsoft.com/office/drawing/2014/main" id="{1446CF81-18DA-4882-8542-7FA528C6881D}"/>
+                <a16:creationId xmlns:a16="http://schemas.microsoft.com/office/drawing/2014/main" xmlns="" id="{1446CF81-18DA-4882-8542-7FA528C6881D}"/>
               </a:ext>
             </a:extLst>
           </p:cNvPr>
@@ -5544,7 +5565,7 @@
           <a:p>
             <a:fld id="{6700A58B-DD98-43D0-B791-721480A02982}" type="datetime1">
               <a:rPr lang="en-US" smtClean="0"/>
-              <a:t>10/28/2018</a:t>
+              <a:t>10/29/2018</a:t>
             </a:fld>
             <a:endParaRPr lang="en-US"/>
           </a:p>
@@ -5555,7 +5576,7 @@
           <p:cNvPr id="3" name="Title 2">
             <a:extLst>
               <a:ext uri="{FF2B5EF4-FFF2-40B4-BE49-F238E27FC236}">
-                <a16:creationId xmlns="" xmlns:a16="http://schemas.microsoft.com/office/drawing/2014/main" id="{614E3173-1F1E-4CF3-A763-737C0F4A4EA7}"/>
+                <a16:creationId xmlns:a16="http://schemas.microsoft.com/office/drawing/2014/main" xmlns="" id="{614E3173-1F1E-4CF3-A763-737C0F4A4EA7}"/>
               </a:ext>
             </a:extLst>
           </p:cNvPr>
@@ -5583,7 +5604,7 @@
           <p:cNvPr id="4" name="Slide Number Placeholder 3">
             <a:extLst>
               <a:ext uri="{FF2B5EF4-FFF2-40B4-BE49-F238E27FC236}">
-                <a16:creationId xmlns="" xmlns:a16="http://schemas.microsoft.com/office/drawing/2014/main" id="{C84D43DA-DA54-4A2F-AFA1-93EE114DE9F2}"/>
+                <a16:creationId xmlns:a16="http://schemas.microsoft.com/office/drawing/2014/main" xmlns="" id="{C84D43DA-DA54-4A2F-AFA1-93EE114DE9F2}"/>
               </a:ext>
             </a:extLst>
           </p:cNvPr>
@@ -5612,7 +5633,7 @@
           <p:cNvPr id="5" name="Footer Placeholder 4">
             <a:extLst>
               <a:ext uri="{FF2B5EF4-FFF2-40B4-BE49-F238E27FC236}">
-                <a16:creationId xmlns="" xmlns:a16="http://schemas.microsoft.com/office/drawing/2014/main" id="{EE31643D-3082-4F21-9828-946838B0DBFB}"/>
+                <a16:creationId xmlns:a16="http://schemas.microsoft.com/office/drawing/2014/main" xmlns="" id="{EE31643D-3082-4F21-9828-946838B0DBFB}"/>
               </a:ext>
             </a:extLst>
           </p:cNvPr>
@@ -5641,7 +5662,7 @@
           <p:cNvPr id="7" name="TextBox 6">
             <a:extLst>
               <a:ext uri="{FF2B5EF4-FFF2-40B4-BE49-F238E27FC236}">
-                <a16:creationId xmlns="" xmlns:a16="http://schemas.microsoft.com/office/drawing/2014/main" id="{709878E9-7B9E-4E44-B365-5CC9BC94906B}"/>
+                <a16:creationId xmlns:a16="http://schemas.microsoft.com/office/drawing/2014/main" xmlns="" id="{709878E9-7B9E-4E44-B365-5CC9BC94906B}"/>
               </a:ext>
             </a:extLst>
           </p:cNvPr>
@@ -5708,7 +5729,7 @@
           <p:cNvPr id="6" name="Picture 5">
             <a:extLst>
               <a:ext uri="{FF2B5EF4-FFF2-40B4-BE49-F238E27FC236}">
-                <a16:creationId xmlns="" xmlns:a16="http://schemas.microsoft.com/office/drawing/2014/main" id="{4D9F30B6-F781-4F9F-A682-E0BD1E45FE16}"/>
+                <a16:creationId xmlns:a16="http://schemas.microsoft.com/office/drawing/2014/main" xmlns="" id="{4D9F30B6-F781-4F9F-A682-E0BD1E45FE16}"/>
               </a:ext>
             </a:extLst>
           </p:cNvPr>
@@ -5738,7 +5759,7 @@
           <p:cNvPr id="9" name="Straight Arrow Connector 8">
             <a:extLst>
               <a:ext uri="{FF2B5EF4-FFF2-40B4-BE49-F238E27FC236}">
-                <a16:creationId xmlns="" xmlns:a16="http://schemas.microsoft.com/office/drawing/2014/main" id="{AE6B1A81-D206-4C60-A13A-401B148C6F40}"/>
+                <a16:creationId xmlns:a16="http://schemas.microsoft.com/office/drawing/2014/main" xmlns="" id="{AE6B1A81-D206-4C60-A13A-401B148C6F40}"/>
               </a:ext>
             </a:extLst>
           </p:cNvPr>
@@ -5777,7 +5798,7 @@
           <p:cNvPr id="11" name="Straight Arrow Connector 10">
             <a:extLst>
               <a:ext uri="{FF2B5EF4-FFF2-40B4-BE49-F238E27FC236}">
-                <a16:creationId xmlns="" xmlns:a16="http://schemas.microsoft.com/office/drawing/2014/main" id="{5324CA85-364D-4FE3-A5DF-7C92F07D1214}"/>
+                <a16:creationId xmlns:a16="http://schemas.microsoft.com/office/drawing/2014/main" xmlns="" id="{5324CA85-364D-4FE3-A5DF-7C92F07D1214}"/>
               </a:ext>
             </a:extLst>
           </p:cNvPr>
@@ -5821,6 +5842,13 @@
   <p:clrMapOvr>
     <a:masterClrMapping/>
   </p:clrMapOvr>
+  <p:timing>
+    <p:tnLst>
+      <p:par>
+        <p:cTn id="1" dur="indefinite" restart="never" nodeType="tmRoot"/>
+      </p:par>
+    </p:tnLst>
+  </p:timing>
 </p:sld>
 </file>
 
@@ -6033,7 +6061,7 @@
             <p:cNvPr id="2" name="Picture 1">
               <a:extLst>
                 <a:ext uri="{FF2B5EF4-FFF2-40B4-BE49-F238E27FC236}">
-                  <a16:creationId xmlns="" xmlns:a16="http://schemas.microsoft.com/office/drawing/2014/main" id="{0A72F1A8-6303-4C5B-829A-D5D8B8D0A219}"/>
+                  <a16:creationId xmlns:a16="http://schemas.microsoft.com/office/drawing/2014/main" xmlns="" id="{0A72F1A8-6303-4C5B-829A-D5D8B8D0A219}"/>
                 </a:ext>
               </a:extLst>
             </p:cNvPr>
@@ -6068,7 +6096,7 @@
             <p:cNvPr id="3" name="Oval 2">
               <a:extLst>
                 <a:ext uri="{FF2B5EF4-FFF2-40B4-BE49-F238E27FC236}">
-                  <a16:creationId xmlns="" xmlns:a16="http://schemas.microsoft.com/office/drawing/2014/main" id="{4D11CEEC-FA26-4A6F-8495-0972C5118DCA}"/>
+                  <a16:creationId xmlns:a16="http://schemas.microsoft.com/office/drawing/2014/main" xmlns="" id="{4D11CEEC-FA26-4A6F-8495-0972C5118DCA}"/>
                 </a:ext>
               </a:extLst>
             </p:cNvPr>
@@ -6120,7 +6148,7 @@
             <p:cNvPr id="6" name="Oval 5">
               <a:extLst>
                 <a:ext uri="{FF2B5EF4-FFF2-40B4-BE49-F238E27FC236}">
-                  <a16:creationId xmlns="" xmlns:a16="http://schemas.microsoft.com/office/drawing/2014/main" id="{2ACB0B4D-22F3-4F5C-8250-3471DC522CAA}"/>
+                  <a16:creationId xmlns:a16="http://schemas.microsoft.com/office/drawing/2014/main" xmlns="" id="{2ACB0B4D-22F3-4F5C-8250-3471DC522CAA}"/>
                 </a:ext>
               </a:extLst>
             </p:cNvPr>
@@ -6172,7 +6200,7 @@
             <p:cNvPr id="7" name="Oval 6">
               <a:extLst>
                 <a:ext uri="{FF2B5EF4-FFF2-40B4-BE49-F238E27FC236}">
-                  <a16:creationId xmlns="" xmlns:a16="http://schemas.microsoft.com/office/drawing/2014/main" id="{75E2F94F-6FB8-42DE-B256-73C9C45C50FA}"/>
+                  <a16:creationId xmlns:a16="http://schemas.microsoft.com/office/drawing/2014/main" xmlns="" id="{75E2F94F-6FB8-42DE-B256-73C9C45C50FA}"/>
                 </a:ext>
               </a:extLst>
             </p:cNvPr>
@@ -6225,7 +6253,7 @@
           <p:cNvPr id="5" name="TextBox 4">
             <a:extLst>
               <a:ext uri="{FF2B5EF4-FFF2-40B4-BE49-F238E27FC236}">
-                <a16:creationId xmlns="" xmlns:a16="http://schemas.microsoft.com/office/drawing/2014/main" id="{991B942D-3A76-4E99-B8FE-8017F665948F}"/>
+                <a16:creationId xmlns:a16="http://schemas.microsoft.com/office/drawing/2014/main" xmlns="" id="{991B942D-3A76-4E99-B8FE-8017F665948F}"/>
               </a:ext>
             </a:extLst>
           </p:cNvPr>
@@ -6507,7 +6535,7 @@
             <p:cNvPr id="2" name="Picture 1">
               <a:extLst>
                 <a:ext uri="{FF2B5EF4-FFF2-40B4-BE49-F238E27FC236}">
-                  <a16:creationId xmlns="" xmlns:a16="http://schemas.microsoft.com/office/drawing/2014/main" id="{0A72F1A8-6303-4C5B-829A-D5D8B8D0A219}"/>
+                  <a16:creationId xmlns:a16="http://schemas.microsoft.com/office/drawing/2014/main" xmlns="" id="{0A72F1A8-6303-4C5B-829A-D5D8B8D0A219}"/>
                 </a:ext>
               </a:extLst>
             </p:cNvPr>
@@ -6542,7 +6570,7 @@
             <p:cNvPr id="4" name="Rectangle 3">
               <a:extLst>
                 <a:ext uri="{FF2B5EF4-FFF2-40B4-BE49-F238E27FC236}">
-                  <a16:creationId xmlns="" xmlns:a16="http://schemas.microsoft.com/office/drawing/2014/main" id="{452D27B2-1D9E-441F-BDC5-3DD825C7C45E}"/>
+                  <a16:creationId xmlns:a16="http://schemas.microsoft.com/office/drawing/2014/main" xmlns="" id="{452D27B2-1D9E-441F-BDC5-3DD825C7C45E}"/>
                 </a:ext>
               </a:extLst>
             </p:cNvPr>
@@ -6594,7 +6622,7 @@
             <p:cNvPr id="9" name="Rectangle 8">
               <a:extLst>
                 <a:ext uri="{FF2B5EF4-FFF2-40B4-BE49-F238E27FC236}">
-                  <a16:creationId xmlns="" xmlns:a16="http://schemas.microsoft.com/office/drawing/2014/main" id="{52286D24-7939-45C7-A62F-4615E026705B}"/>
+                  <a16:creationId xmlns:a16="http://schemas.microsoft.com/office/drawing/2014/main" xmlns="" id="{52286D24-7939-45C7-A62F-4615E026705B}"/>
                 </a:ext>
               </a:extLst>
             </p:cNvPr>
@@ -6647,7 +6675,7 @@
           <p:cNvPr id="5" name="TextBox 4">
             <a:extLst>
               <a:ext uri="{FF2B5EF4-FFF2-40B4-BE49-F238E27FC236}">
-                <a16:creationId xmlns="" xmlns:a16="http://schemas.microsoft.com/office/drawing/2014/main" id="{991B942D-3A76-4E99-B8FE-8017F665948F}"/>
+                <a16:creationId xmlns:a16="http://schemas.microsoft.com/office/drawing/2014/main" xmlns="" id="{991B942D-3A76-4E99-B8FE-8017F665948F}"/>
               </a:ext>
             </a:extLst>
           </p:cNvPr>
@@ -6896,7 +6924,7 @@
             <p:cNvPr id="2" name="Picture 1">
               <a:extLst>
                 <a:ext uri="{FF2B5EF4-FFF2-40B4-BE49-F238E27FC236}">
-                  <a16:creationId xmlns="" xmlns:a16="http://schemas.microsoft.com/office/drawing/2014/main" id="{0A72F1A8-6303-4C5B-829A-D5D8B8D0A219}"/>
+                  <a16:creationId xmlns:a16="http://schemas.microsoft.com/office/drawing/2014/main" xmlns="" id="{0A72F1A8-6303-4C5B-829A-D5D8B8D0A219}"/>
                 </a:ext>
               </a:extLst>
             </p:cNvPr>
@@ -6931,7 +6959,7 @@
             <p:cNvPr id="4" name="Rectangle 3">
               <a:extLst>
                 <a:ext uri="{FF2B5EF4-FFF2-40B4-BE49-F238E27FC236}">
-                  <a16:creationId xmlns="" xmlns:a16="http://schemas.microsoft.com/office/drawing/2014/main" id="{452D27B2-1D9E-441F-BDC5-3DD825C7C45E}"/>
+                  <a16:creationId xmlns:a16="http://schemas.microsoft.com/office/drawing/2014/main" xmlns="" id="{452D27B2-1D9E-441F-BDC5-3DD825C7C45E}"/>
                 </a:ext>
               </a:extLst>
             </p:cNvPr>
@@ -6983,7 +7011,7 @@
             <p:cNvPr id="9" name="Rectangle 8">
               <a:extLst>
                 <a:ext uri="{FF2B5EF4-FFF2-40B4-BE49-F238E27FC236}">
-                  <a16:creationId xmlns="" xmlns:a16="http://schemas.microsoft.com/office/drawing/2014/main" id="{52286D24-7939-45C7-A62F-4615E026705B}"/>
+                  <a16:creationId xmlns:a16="http://schemas.microsoft.com/office/drawing/2014/main" xmlns="" id="{52286D24-7939-45C7-A62F-4615E026705B}"/>
                 </a:ext>
               </a:extLst>
             </p:cNvPr>
@@ -7036,7 +7064,7 @@
           <p:cNvPr id="5" name="TextBox 4">
             <a:extLst>
               <a:ext uri="{FF2B5EF4-FFF2-40B4-BE49-F238E27FC236}">
-                <a16:creationId xmlns="" xmlns:a16="http://schemas.microsoft.com/office/drawing/2014/main" id="{991B942D-3A76-4E99-B8FE-8017F665948F}"/>
+                <a16:creationId xmlns:a16="http://schemas.microsoft.com/office/drawing/2014/main" xmlns="" id="{991B942D-3A76-4E99-B8FE-8017F665948F}"/>
               </a:ext>
             </a:extLst>
           </p:cNvPr>
@@ -7276,7 +7304,7 @@
           <a:p>
             <a:fld id="{6700A58B-DD98-43D0-B791-721480A02982}" type="datetime1">
               <a:rPr lang="en-US" smtClean="0"/>
-              <a:t>10/28/2018</a:t>
+              <a:t>10/29/2018</a:t>
             </a:fld>
             <a:endParaRPr lang="en-US"/>
           </a:p>
@@ -8703,6 +8731,13 @@
   <p:clrMapOvr>
     <a:masterClrMapping/>
   </p:clrMapOvr>
+  <p:timing>
+    <p:tnLst>
+      <p:par>
+        <p:cTn id="1" dur="indefinite" restart="never" nodeType="tmRoot"/>
+      </p:par>
+    </p:tnLst>
+  </p:timing>
 </p:sld>
 </file>
 
@@ -9124,6 +9159,13 @@
   <p:clrMapOvr>
     <a:masterClrMapping/>
   </p:clrMapOvr>
+  <p:timing>
+    <p:tnLst>
+      <p:par>
+        <p:cTn id="1" dur="indefinite" restart="never" nodeType="tmRoot"/>
+      </p:par>
+    </p:tnLst>
+  </p:timing>
 </p:sld>
 </file>
 
@@ -9195,21 +9237,21 @@
                 <a:gridCol w="1242805">
                   <a:extLst>
                     <a:ext uri="{9D8B030D-6E8A-4147-A177-3AD203B41FA5}">
-                      <a16:colId xmlns="" xmlns:a16="http://schemas.microsoft.com/office/drawing/2014/main" val="20000"/>
+                      <a16:colId xmlns:a16="http://schemas.microsoft.com/office/drawing/2014/main" xmlns="" val="20000"/>
                     </a:ext>
                   </a:extLst>
                 </a:gridCol>
                 <a:gridCol w="861296">
                   <a:extLst>
                     <a:ext uri="{9D8B030D-6E8A-4147-A177-3AD203B41FA5}">
-                      <a16:colId xmlns="" xmlns:a16="http://schemas.microsoft.com/office/drawing/2014/main" val="20001"/>
+                      <a16:colId xmlns:a16="http://schemas.microsoft.com/office/drawing/2014/main" xmlns="" val="20001"/>
                     </a:ext>
                   </a:extLst>
                 </a:gridCol>
                 <a:gridCol w="5811174">
                   <a:extLst>
                     <a:ext uri="{9D8B030D-6E8A-4147-A177-3AD203B41FA5}">
-                      <a16:colId xmlns="" xmlns:a16="http://schemas.microsoft.com/office/drawing/2014/main" val="20002"/>
+                      <a16:colId xmlns:a16="http://schemas.microsoft.com/office/drawing/2014/main" xmlns="" val="20002"/>
                     </a:ext>
                   </a:extLst>
                 </a:gridCol>
@@ -9258,7 +9300,7 @@
                 </a:tc>
                 <a:extLst>
                   <a:ext uri="{0D108BD9-81ED-4DB2-BD59-A6C34878D82A}">
-                    <a16:rowId xmlns="" xmlns:a16="http://schemas.microsoft.com/office/drawing/2014/main" val="10000"/>
+                    <a16:rowId xmlns:a16="http://schemas.microsoft.com/office/drawing/2014/main" xmlns="" val="10000"/>
                   </a:ext>
                 </a:extLst>
               </a:tr>
@@ -9323,7 +9365,7 @@
                 </a:tc>
                 <a:extLst>
                   <a:ext uri="{0D108BD9-81ED-4DB2-BD59-A6C34878D82A}">
-                    <a16:rowId xmlns="" xmlns:a16="http://schemas.microsoft.com/office/drawing/2014/main" val="10001"/>
+                    <a16:rowId xmlns:a16="http://schemas.microsoft.com/office/drawing/2014/main" xmlns="" val="10001"/>
                   </a:ext>
                 </a:extLst>
               </a:tr>
@@ -9380,7 +9422,7 @@
                 </a:tc>
                 <a:extLst>
                   <a:ext uri="{0D108BD9-81ED-4DB2-BD59-A6C34878D82A}">
-                    <a16:rowId xmlns="" xmlns:a16="http://schemas.microsoft.com/office/drawing/2014/main" val="10002"/>
+                    <a16:rowId xmlns:a16="http://schemas.microsoft.com/office/drawing/2014/main" xmlns="" val="10002"/>
                   </a:ext>
                 </a:extLst>
               </a:tr>
@@ -9423,7 +9465,7 @@
                 </a:tc>
                 <a:extLst>
                   <a:ext uri="{0D108BD9-81ED-4DB2-BD59-A6C34878D82A}">
-                    <a16:rowId xmlns="" xmlns:a16="http://schemas.microsoft.com/office/drawing/2014/main" val="10003"/>
+                    <a16:rowId xmlns:a16="http://schemas.microsoft.com/office/drawing/2014/main" xmlns="" val="10003"/>
                   </a:ext>
                 </a:extLst>
               </a:tr>
@@ -9470,7 +9512,7 @@
                 </a:tc>
                 <a:extLst>
                   <a:ext uri="{0D108BD9-81ED-4DB2-BD59-A6C34878D82A}">
-                    <a16:rowId xmlns="" xmlns:a16="http://schemas.microsoft.com/office/drawing/2014/main" val="10004"/>
+                    <a16:rowId xmlns:a16="http://schemas.microsoft.com/office/drawing/2014/main" xmlns="" val="10004"/>
                   </a:ext>
                 </a:extLst>
               </a:tr>
@@ -9513,7 +9555,7 @@
                 </a:tc>
                 <a:extLst>
                   <a:ext uri="{0D108BD9-81ED-4DB2-BD59-A6C34878D82A}">
-                    <a16:rowId xmlns="" xmlns:a16="http://schemas.microsoft.com/office/drawing/2014/main" val="10005"/>
+                    <a16:rowId xmlns:a16="http://schemas.microsoft.com/office/drawing/2014/main" xmlns="" val="10005"/>
                   </a:ext>
                 </a:extLst>
               </a:tr>
@@ -9552,7 +9594,7 @@
                 </a:tc>
                 <a:extLst>
                   <a:ext uri="{0D108BD9-81ED-4DB2-BD59-A6C34878D82A}">
-                    <a16:rowId xmlns="" xmlns:a16="http://schemas.microsoft.com/office/drawing/2014/main" val="10006"/>
+                    <a16:rowId xmlns:a16="http://schemas.microsoft.com/office/drawing/2014/main" xmlns="" val="10006"/>
                   </a:ext>
                 </a:extLst>
               </a:tr>
@@ -9591,7 +9633,7 @@
                 </a:tc>
                 <a:extLst>
                   <a:ext uri="{0D108BD9-81ED-4DB2-BD59-A6C34878D82A}">
-                    <a16:rowId xmlns="" xmlns:a16="http://schemas.microsoft.com/office/drawing/2014/main" val="10007"/>
+                    <a16:rowId xmlns:a16="http://schemas.microsoft.com/office/drawing/2014/main" xmlns="" val="10007"/>
                   </a:ext>
                 </a:extLst>
               </a:tr>
@@ -9616,7 +9658,7 @@
           <a:p>
             <a:fld id="{9B19E99B-5349-415A-8E56-8E989211A366}" type="datetime1">
               <a:rPr lang="en-US" smtClean="0"/>
-              <a:t>10/28/2018</a:t>
+              <a:t>10/29/2018</a:t>
             </a:fld>
             <a:endParaRPr lang="en-US"/>
           </a:p>
@@ -9678,6 +9720,13 @@
   <p:clrMapOvr>
     <a:masterClrMapping/>
   </p:clrMapOvr>
+  <p:timing>
+    <p:tnLst>
+      <p:par>
+        <p:cTn id="1" dur="indefinite" restart="never" nodeType="tmRoot"/>
+      </p:par>
+    </p:tnLst>
+  </p:timing>
 </p:sld>
 </file>
 
@@ -9824,6 +9873,13 @@
   <p:clrMapOvr>
     <a:masterClrMapping/>
   </p:clrMapOvr>
+  <p:timing>
+    <p:tnLst>
+      <p:par>
+        <p:cTn id="1" dur="indefinite" restart="never" nodeType="tmRoot"/>
+      </p:par>
+    </p:tnLst>
+  </p:timing>
 </p:sld>
 </file>
 
@@ -9865,7 +9921,7 @@
           <a:graphicData uri="http://schemas.openxmlformats.org/presentationml/2006/ole">
             <mc:AlternateContent xmlns:mc="http://schemas.openxmlformats.org/markup-compatibility/2006">
               <mc:Choice xmlns:v="urn:schemas-microsoft-com:vml" Requires="v">
-                <p:oleObj spid="_x0000_s3120" name="think-cell Slide" r:id="rId5" imgW="270" imgH="270" progId="TCLayout.ActiveDocument.1">
+                <p:oleObj spid="_x0000_s3121" name="think-cell Slide" r:id="rId5" imgW="270" imgH="270" progId="TCLayout.ActiveDocument.1">
                   <p:embed/>
                 </p:oleObj>
               </mc:Choice>
@@ -10257,6 +10313,13 @@
   <p:clrMapOvr>
     <a:masterClrMapping/>
   </p:clrMapOvr>
+  <p:timing>
+    <p:tnLst>
+      <p:par>
+        <p:cTn id="1" dur="indefinite" restart="never" nodeType="tmRoot"/>
+      </p:par>
+    </p:tnLst>
+  </p:timing>
 </p:sld>
 </file>
 
@@ -10345,7 +10408,7 @@
           <a:p>
             <a:fld id="{D753EFC8-4232-4598-94F6-94C0EBAFC469}" type="datetime1">
               <a:rPr lang="en-US" smtClean="0"/>
-              <a:t>10/28/2018</a:t>
+              <a:t>10/29/2018</a:t>
             </a:fld>
             <a:endParaRPr lang="en-US"/>
           </a:p>
@@ -10407,6 +10470,13 @@
   <p:clrMapOvr>
     <a:masterClrMapping/>
   </p:clrMapOvr>
+  <p:timing>
+    <p:tnLst>
+      <p:par>
+        <p:cTn id="1" dur="indefinite" restart="never" nodeType="tmRoot"/>
+      </p:par>
+    </p:tnLst>
+  </p:timing>
 </p:sld>
 </file>
 
@@ -10477,7 +10547,7 @@
           <a:graphicData uri="http://schemas.openxmlformats.org/presentationml/2006/ole">
             <mc:AlternateContent xmlns:mc="http://schemas.openxmlformats.org/markup-compatibility/2006">
               <mc:Choice xmlns:v="urn:schemas-microsoft-com:vml" Requires="v">
-                <p:oleObj spid="_x0000_s17450" name="think-cell Slide" r:id="rId6" imgW="270" imgH="270" progId="TCLayout.ActiveDocument.1">
+                <p:oleObj spid="_x0000_s17451" name="think-cell Slide" r:id="rId6" imgW="270" imgH="270" progId="TCLayout.ActiveDocument.1">
                   <p:embed/>
                 </p:oleObj>
               </mc:Choice>
@@ -10744,21 +10814,21 @@
                 <a:gridCol w="1242805">
                   <a:extLst>
                     <a:ext uri="{9D8B030D-6E8A-4147-A177-3AD203B41FA5}">
-                      <a16:colId xmlns="" xmlns:a16="http://schemas.microsoft.com/office/drawing/2014/main" val="20000"/>
+                      <a16:colId xmlns:a16="http://schemas.microsoft.com/office/drawing/2014/main" xmlns="" val="20000"/>
                     </a:ext>
                   </a:extLst>
                 </a:gridCol>
                 <a:gridCol w="861296">
                   <a:extLst>
                     <a:ext uri="{9D8B030D-6E8A-4147-A177-3AD203B41FA5}">
-                      <a16:colId xmlns="" xmlns:a16="http://schemas.microsoft.com/office/drawing/2014/main" val="20001"/>
+                      <a16:colId xmlns:a16="http://schemas.microsoft.com/office/drawing/2014/main" xmlns="" val="20001"/>
                     </a:ext>
                   </a:extLst>
                 </a:gridCol>
                 <a:gridCol w="5811174">
                   <a:extLst>
                     <a:ext uri="{9D8B030D-6E8A-4147-A177-3AD203B41FA5}">
-                      <a16:colId xmlns="" xmlns:a16="http://schemas.microsoft.com/office/drawing/2014/main" val="20002"/>
+                      <a16:colId xmlns:a16="http://schemas.microsoft.com/office/drawing/2014/main" xmlns="" val="20002"/>
                     </a:ext>
                   </a:extLst>
                 </a:gridCol>
@@ -10807,7 +10877,7 @@
                 </a:tc>
                 <a:extLst>
                   <a:ext uri="{0D108BD9-81ED-4DB2-BD59-A6C34878D82A}">
-                    <a16:rowId xmlns="" xmlns:a16="http://schemas.microsoft.com/office/drawing/2014/main" val="10000"/>
+                    <a16:rowId xmlns:a16="http://schemas.microsoft.com/office/drawing/2014/main" xmlns="" val="10000"/>
                   </a:ext>
                 </a:extLst>
               </a:tr>
@@ -10872,7 +10942,7 @@
                 </a:tc>
                 <a:extLst>
                   <a:ext uri="{0D108BD9-81ED-4DB2-BD59-A6C34878D82A}">
-                    <a16:rowId xmlns="" xmlns:a16="http://schemas.microsoft.com/office/drawing/2014/main" val="10001"/>
+                    <a16:rowId xmlns:a16="http://schemas.microsoft.com/office/drawing/2014/main" xmlns="" val="10001"/>
                   </a:ext>
                 </a:extLst>
               </a:tr>
@@ -10929,7 +10999,7 @@
                 </a:tc>
                 <a:extLst>
                   <a:ext uri="{0D108BD9-81ED-4DB2-BD59-A6C34878D82A}">
-                    <a16:rowId xmlns="" xmlns:a16="http://schemas.microsoft.com/office/drawing/2014/main" val="10002"/>
+                    <a16:rowId xmlns:a16="http://schemas.microsoft.com/office/drawing/2014/main" xmlns="" val="10002"/>
                   </a:ext>
                 </a:extLst>
               </a:tr>
@@ -10972,7 +11042,7 @@
                 </a:tc>
                 <a:extLst>
                   <a:ext uri="{0D108BD9-81ED-4DB2-BD59-A6C34878D82A}">
-                    <a16:rowId xmlns="" xmlns:a16="http://schemas.microsoft.com/office/drawing/2014/main" val="10003"/>
+                    <a16:rowId xmlns:a16="http://schemas.microsoft.com/office/drawing/2014/main" xmlns="" val="10003"/>
                   </a:ext>
                 </a:extLst>
               </a:tr>
@@ -11019,7 +11089,7 @@
                 </a:tc>
                 <a:extLst>
                   <a:ext uri="{0D108BD9-81ED-4DB2-BD59-A6C34878D82A}">
-                    <a16:rowId xmlns="" xmlns:a16="http://schemas.microsoft.com/office/drawing/2014/main" val="10004"/>
+                    <a16:rowId xmlns:a16="http://schemas.microsoft.com/office/drawing/2014/main" xmlns="" val="10004"/>
                   </a:ext>
                 </a:extLst>
               </a:tr>
@@ -11062,7 +11132,7 @@
                 </a:tc>
                 <a:extLst>
                   <a:ext uri="{0D108BD9-81ED-4DB2-BD59-A6C34878D82A}">
-                    <a16:rowId xmlns="" xmlns:a16="http://schemas.microsoft.com/office/drawing/2014/main" val="10005"/>
+                    <a16:rowId xmlns:a16="http://schemas.microsoft.com/office/drawing/2014/main" xmlns="" val="10005"/>
                   </a:ext>
                 </a:extLst>
               </a:tr>
@@ -11101,7 +11171,7 @@
                 </a:tc>
                 <a:extLst>
                   <a:ext uri="{0D108BD9-81ED-4DB2-BD59-A6C34878D82A}">
-                    <a16:rowId xmlns="" xmlns:a16="http://schemas.microsoft.com/office/drawing/2014/main" val="10006"/>
+                    <a16:rowId xmlns:a16="http://schemas.microsoft.com/office/drawing/2014/main" xmlns="" val="10006"/>
                   </a:ext>
                 </a:extLst>
               </a:tr>
@@ -11140,7 +11210,7 @@
                 </a:tc>
                 <a:extLst>
                   <a:ext uri="{0D108BD9-81ED-4DB2-BD59-A6C34878D82A}">
-                    <a16:rowId xmlns="" xmlns:a16="http://schemas.microsoft.com/office/drawing/2014/main" val="10007"/>
+                    <a16:rowId xmlns:a16="http://schemas.microsoft.com/office/drawing/2014/main" xmlns="" val="10007"/>
                   </a:ext>
                 </a:extLst>
               </a:tr>
@@ -11165,7 +11235,7 @@
           <a:p>
             <a:fld id="{9B19E99B-5349-415A-8E56-8E989211A366}" type="datetime1">
               <a:rPr lang="en-US" smtClean="0"/>
-              <a:t>10/28/2018</a:t>
+              <a:t>10/29/2018</a:t>
             </a:fld>
             <a:endParaRPr lang="en-US"/>
           </a:p>
@@ -11227,6 +11297,13 @@
   <p:clrMapOvr>
     <a:masterClrMapping/>
   </p:clrMapOvr>
+  <p:timing>
+    <p:tnLst>
+      <p:par>
+        <p:cTn id="1" dur="indefinite" restart="never" nodeType="tmRoot"/>
+      </p:par>
+    </p:tnLst>
+  </p:timing>
 </p:sld>
 </file>
 
@@ -11268,7 +11345,7 @@
           <a:graphicData uri="http://schemas.openxmlformats.org/presentationml/2006/ole">
             <mc:AlternateContent xmlns:mc="http://schemas.openxmlformats.org/markup-compatibility/2006">
               <mc:Choice xmlns:v="urn:schemas-microsoft-com:vml" Requires="v">
-                <p:oleObj spid="_x0000_s5168" name="think-cell Slide" r:id="rId5" imgW="270" imgH="270" progId="TCLayout.ActiveDocument.1">
+                <p:oleObj spid="_x0000_s5169" name="think-cell Slide" r:id="rId5" imgW="270" imgH="270" progId="TCLayout.ActiveDocument.1">
                   <p:embed/>
                 </p:oleObj>
               </mc:Choice>
@@ -12105,11 +12182,7 @@
             <a:pPr algn="ctr"/>
             <a:r>
               <a:rPr lang="en-US" dirty="0" smtClean="0"/>
-              <a:t>ARIMA &amp; Linear Model Forecasting is in the </a:t>
-            </a:r>
-            <a:r>
-              <a:rPr lang="en-US" dirty="0" smtClean="0"/>
-              <a:t>Appendix </a:t>
+              <a:t>ARIMA &amp; Linear Model Forecasting is in the Appendix </a:t>
             </a:r>
             <a:r>
               <a:rPr lang="en-US" dirty="0" err="1"/>
@@ -12123,7 +12196,6 @@
               <a:rPr lang="en-US" dirty="0" smtClean="0"/>
               <a:t>.  </a:t>
             </a:r>
-            <a:endParaRPr lang="en-US" dirty="0" smtClean="0"/>
           </a:p>
           <a:p>
             <a:pPr algn="ctr"/>
@@ -12583,6 +12655,13 @@
   <p:clrMapOvr>
     <a:masterClrMapping/>
   </p:clrMapOvr>
+  <p:timing>
+    <p:tnLst>
+      <p:par>
+        <p:cTn id="1" dur="indefinite" restart="never" nodeType="tmRoot"/>
+      </p:par>
+    </p:tnLst>
+  </p:timing>
 </p:sld>
 </file>
 
@@ -12643,7 +12722,7 @@
           <a:p>
             <a:fld id="{D753EFC8-4232-4598-94F6-94C0EBAFC469}" type="datetime1">
               <a:rPr lang="en-US" smtClean="0"/>
-              <a:t>10/28/2018</a:t>
+              <a:t>10/29/2018</a:t>
             </a:fld>
             <a:endParaRPr lang="en-US"/>
           </a:p>
@@ -12870,6 +12949,13 @@
   <p:clrMapOvr>
     <a:masterClrMapping/>
   </p:clrMapOvr>
+  <p:timing>
+    <p:tnLst>
+      <p:par>
+        <p:cTn id="1" dur="indefinite" restart="never" nodeType="tmRoot"/>
+      </p:par>
+    </p:tnLst>
+  </p:timing>
 </p:sld>
 </file>
 
@@ -12930,7 +13016,7 @@
           <a:p>
             <a:fld id="{D753EFC8-4232-4598-94F6-94C0EBAFC469}" type="datetime1">
               <a:rPr lang="en-US" smtClean="0"/>
-              <a:t>10/28/2018</a:t>
+              <a:t>10/29/2018</a:t>
             </a:fld>
             <a:endParaRPr lang="en-US"/>
           </a:p>
@@ -13157,6 +13243,13 @@
   <p:clrMapOvr>
     <a:masterClrMapping/>
   </p:clrMapOvr>
+  <p:timing>
+    <p:tnLst>
+      <p:par>
+        <p:cTn id="1" dur="indefinite" restart="never" nodeType="tmRoot"/>
+      </p:par>
+    </p:tnLst>
+  </p:timing>
 </p:sld>
 </file>
 
@@ -13216,7 +13309,7 @@
           <a:p>
             <a:fld id="{D753EFC8-4232-4598-94F6-94C0EBAFC469}" type="datetime1">
               <a:rPr lang="en-US" smtClean="0"/>
-              <a:t>10/28/2018</a:t>
+              <a:t>10/29/2018</a:t>
             </a:fld>
             <a:endParaRPr lang="en-US"/>
           </a:p>
@@ -13473,6 +13566,13 @@
   <p:clrMapOvr>
     <a:masterClrMapping/>
   </p:clrMapOvr>
+  <p:timing>
+    <p:tnLst>
+      <p:par>
+        <p:cTn id="1" dur="indefinite" restart="never" nodeType="tmRoot"/>
+      </p:par>
+    </p:tnLst>
+  </p:timing>
 </p:sld>
 </file>
 
@@ -13498,7 +13598,7 @@
           <p:cNvPr id="2" name="Date Placeholder 1">
             <a:extLst>
               <a:ext uri="{FF2B5EF4-FFF2-40B4-BE49-F238E27FC236}">
-                <a16:creationId xmlns="" xmlns:a16="http://schemas.microsoft.com/office/drawing/2014/main" id="{CA79CF12-30E2-42AE-B34C-9BC94FEBF964}"/>
+                <a16:creationId xmlns:a16="http://schemas.microsoft.com/office/drawing/2014/main" xmlns="" id="{CA79CF12-30E2-42AE-B34C-9BC94FEBF964}"/>
               </a:ext>
             </a:extLst>
           </p:cNvPr>
@@ -13516,7 +13616,7 @@
           <a:p>
             <a:fld id="{6700A58B-DD98-43D0-B791-721480A02982}" type="datetime1">
               <a:rPr lang="en-US" smtClean="0"/>
-              <a:t>10/28/2018</a:t>
+              <a:t>10/29/2018</a:t>
             </a:fld>
             <a:endParaRPr lang="en-US"/>
           </a:p>
@@ -13527,7 +13627,7 @@
           <p:cNvPr id="4" name="Slide Number Placeholder 3">
             <a:extLst>
               <a:ext uri="{FF2B5EF4-FFF2-40B4-BE49-F238E27FC236}">
-                <a16:creationId xmlns="" xmlns:a16="http://schemas.microsoft.com/office/drawing/2014/main" id="{31D84C2A-4276-4290-A121-0469B8157876}"/>
+                <a16:creationId xmlns:a16="http://schemas.microsoft.com/office/drawing/2014/main" xmlns="" id="{31D84C2A-4276-4290-A121-0469B8157876}"/>
               </a:ext>
             </a:extLst>
           </p:cNvPr>
@@ -13556,7 +13656,7 @@
           <p:cNvPr id="5" name="Footer Placeholder 4">
             <a:extLst>
               <a:ext uri="{FF2B5EF4-FFF2-40B4-BE49-F238E27FC236}">
-                <a16:creationId xmlns="" xmlns:a16="http://schemas.microsoft.com/office/drawing/2014/main" id="{7CF45EE8-995A-4EDF-98B2-876D4AB98FDA}"/>
+                <a16:creationId xmlns:a16="http://schemas.microsoft.com/office/drawing/2014/main" xmlns="" id="{7CF45EE8-995A-4EDF-98B2-876D4AB98FDA}"/>
               </a:ext>
             </a:extLst>
           </p:cNvPr>
@@ -13585,7 +13685,7 @@
           <p:cNvPr id="6" name="Content Placeholder 2">
             <a:extLst>
               <a:ext uri="{FF2B5EF4-FFF2-40B4-BE49-F238E27FC236}">
-                <a16:creationId xmlns="" xmlns:a16="http://schemas.microsoft.com/office/drawing/2014/main" id="{0F99D124-A478-4855-982C-0F6EAD9A487E}"/>
+                <a16:creationId xmlns:a16="http://schemas.microsoft.com/office/drawing/2014/main" xmlns="" id="{0F99D124-A478-4855-982C-0F6EAD9A487E}"/>
               </a:ext>
             </a:extLst>
           </p:cNvPr>
@@ -13858,7 +13958,7 @@
           <p:cNvPr id="7" name="Title 1">
             <a:extLst>
               <a:ext uri="{FF2B5EF4-FFF2-40B4-BE49-F238E27FC236}">
-                <a16:creationId xmlns="" xmlns:a16="http://schemas.microsoft.com/office/drawing/2014/main" id="{CF693E49-70BD-4C3F-A7E3-57DB09DE4ABC}"/>
+                <a16:creationId xmlns:a16="http://schemas.microsoft.com/office/drawing/2014/main" xmlns="" id="{CF693E49-70BD-4C3F-A7E3-57DB09DE4ABC}"/>
               </a:ext>
             </a:extLst>
           </p:cNvPr>
@@ -13891,6 +13991,13 @@
   <p:clrMapOvr>
     <a:masterClrMapping/>
   </p:clrMapOvr>
+  <p:timing>
+    <p:tnLst>
+      <p:par>
+        <p:cTn id="1" dur="indefinite" restart="never" nodeType="tmRoot"/>
+      </p:par>
+    </p:tnLst>
+  </p:timing>
 </p:sld>
 </file>
 
@@ -13980,7 +14087,7 @@
           <a:p>
             <a:fld id="{D753EFC8-4232-4598-94F6-94C0EBAFC469}" type="datetime1">
               <a:rPr lang="en-US" smtClean="0"/>
-              <a:t>10/28/2018</a:t>
+              <a:t>10/29/2018</a:t>
             </a:fld>
             <a:endParaRPr lang="en-US"/>
           </a:p>
@@ -14182,6 +14289,13 @@
   <p:clrMapOvr>
     <a:masterClrMapping/>
   </p:clrMapOvr>
+  <p:timing>
+    <p:tnLst>
+      <p:par>
+        <p:cTn id="1" dur="indefinite" restart="never" nodeType="tmRoot"/>
+      </p:par>
+    </p:tnLst>
+  </p:timing>
 </p:sld>
 </file>
 
@@ -14271,7 +14385,7 @@
           <a:p>
             <a:fld id="{D753EFC8-4232-4598-94F6-94C0EBAFC469}" type="datetime1">
               <a:rPr lang="en-US" smtClean="0"/>
-              <a:t>10/28/2018</a:t>
+              <a:t>10/29/2018</a:t>
             </a:fld>
             <a:endParaRPr lang="en-US"/>
           </a:p>
@@ -14795,7 +14909,7 @@
           <a:p>
             <a:fld id="{D753EFC8-4232-4598-94F6-94C0EBAFC469}" type="datetime1">
               <a:rPr lang="en-US" smtClean="0"/>
-              <a:t>10/28/2018</a:t>
+              <a:t>10/29/2018</a:t>
             </a:fld>
             <a:endParaRPr lang="en-US"/>
           </a:p>
@@ -15196,7 +15310,7 @@
           <a:p>
             <a:fld id="{D753EFC8-4232-4598-94F6-94C0EBAFC469}" type="datetime1">
               <a:rPr lang="en-US" smtClean="0"/>
-              <a:t>10/28/2018</a:t>
+              <a:t>10/29/2018</a:t>
             </a:fld>
             <a:endParaRPr lang="en-US"/>
           </a:p>
@@ -15773,7 +15887,7 @@
           <a:p>
             <a:fld id="{D753EFC8-4232-4598-94F6-94C0EBAFC469}" type="datetime1">
               <a:rPr lang="en-US" smtClean="0"/>
-              <a:t>10/28/2018</a:t>
+              <a:t>10/29/2018</a:t>
             </a:fld>
             <a:endParaRPr lang="en-US"/>
           </a:p>
@@ -15913,21 +16027,21 @@
                 <a:gridCol w="1242805">
                   <a:extLst>
                     <a:ext uri="{9D8B030D-6E8A-4147-A177-3AD203B41FA5}">
-                      <a16:colId xmlns="" xmlns:a16="http://schemas.microsoft.com/office/drawing/2014/main" val="20000"/>
+                      <a16:colId xmlns:a16="http://schemas.microsoft.com/office/drawing/2014/main" xmlns="" val="20000"/>
                     </a:ext>
                   </a:extLst>
                 </a:gridCol>
                 <a:gridCol w="861296">
                   <a:extLst>
                     <a:ext uri="{9D8B030D-6E8A-4147-A177-3AD203B41FA5}">
-                      <a16:colId xmlns="" xmlns:a16="http://schemas.microsoft.com/office/drawing/2014/main" val="20001"/>
+                      <a16:colId xmlns:a16="http://schemas.microsoft.com/office/drawing/2014/main" xmlns="" val="20001"/>
                     </a:ext>
                   </a:extLst>
                 </a:gridCol>
                 <a:gridCol w="5811174">
                   <a:extLst>
                     <a:ext uri="{9D8B030D-6E8A-4147-A177-3AD203B41FA5}">
-                      <a16:colId xmlns="" xmlns:a16="http://schemas.microsoft.com/office/drawing/2014/main" val="20002"/>
+                      <a16:colId xmlns:a16="http://schemas.microsoft.com/office/drawing/2014/main" xmlns="" val="20002"/>
                     </a:ext>
                   </a:extLst>
                 </a:gridCol>
@@ -15976,7 +16090,7 @@
                 </a:tc>
                 <a:extLst>
                   <a:ext uri="{0D108BD9-81ED-4DB2-BD59-A6C34878D82A}">
-                    <a16:rowId xmlns="" xmlns:a16="http://schemas.microsoft.com/office/drawing/2014/main" val="10000"/>
+                    <a16:rowId xmlns:a16="http://schemas.microsoft.com/office/drawing/2014/main" xmlns="" val="10000"/>
                   </a:ext>
                 </a:extLst>
               </a:tr>
@@ -16041,7 +16155,7 @@
                 </a:tc>
                 <a:extLst>
                   <a:ext uri="{0D108BD9-81ED-4DB2-BD59-A6C34878D82A}">
-                    <a16:rowId xmlns="" xmlns:a16="http://schemas.microsoft.com/office/drawing/2014/main" val="10001"/>
+                    <a16:rowId xmlns:a16="http://schemas.microsoft.com/office/drawing/2014/main" xmlns="" val="10001"/>
                   </a:ext>
                 </a:extLst>
               </a:tr>
@@ -16098,7 +16212,7 @@
                 </a:tc>
                 <a:extLst>
                   <a:ext uri="{0D108BD9-81ED-4DB2-BD59-A6C34878D82A}">
-                    <a16:rowId xmlns="" xmlns:a16="http://schemas.microsoft.com/office/drawing/2014/main" val="10002"/>
+                    <a16:rowId xmlns:a16="http://schemas.microsoft.com/office/drawing/2014/main" xmlns="" val="10002"/>
                   </a:ext>
                 </a:extLst>
               </a:tr>
@@ -16141,7 +16255,7 @@
                 </a:tc>
                 <a:extLst>
                   <a:ext uri="{0D108BD9-81ED-4DB2-BD59-A6C34878D82A}">
-                    <a16:rowId xmlns="" xmlns:a16="http://schemas.microsoft.com/office/drawing/2014/main" val="10003"/>
+                    <a16:rowId xmlns:a16="http://schemas.microsoft.com/office/drawing/2014/main" xmlns="" val="10003"/>
                   </a:ext>
                 </a:extLst>
               </a:tr>
@@ -16188,7 +16302,7 @@
                 </a:tc>
                 <a:extLst>
                   <a:ext uri="{0D108BD9-81ED-4DB2-BD59-A6C34878D82A}">
-                    <a16:rowId xmlns="" xmlns:a16="http://schemas.microsoft.com/office/drawing/2014/main" val="10004"/>
+                    <a16:rowId xmlns:a16="http://schemas.microsoft.com/office/drawing/2014/main" xmlns="" val="10004"/>
                   </a:ext>
                 </a:extLst>
               </a:tr>
@@ -16231,7 +16345,7 @@
                 </a:tc>
                 <a:extLst>
                   <a:ext uri="{0D108BD9-81ED-4DB2-BD59-A6C34878D82A}">
-                    <a16:rowId xmlns="" xmlns:a16="http://schemas.microsoft.com/office/drawing/2014/main" val="10005"/>
+                    <a16:rowId xmlns:a16="http://schemas.microsoft.com/office/drawing/2014/main" xmlns="" val="10005"/>
                   </a:ext>
                 </a:extLst>
               </a:tr>
@@ -16270,7 +16384,7 @@
                 </a:tc>
                 <a:extLst>
                   <a:ext uri="{0D108BD9-81ED-4DB2-BD59-A6C34878D82A}">
-                    <a16:rowId xmlns="" xmlns:a16="http://schemas.microsoft.com/office/drawing/2014/main" val="10006"/>
+                    <a16:rowId xmlns:a16="http://schemas.microsoft.com/office/drawing/2014/main" xmlns="" val="10006"/>
                   </a:ext>
                 </a:extLst>
               </a:tr>
@@ -16309,7 +16423,7 @@
                 </a:tc>
                 <a:extLst>
                   <a:ext uri="{0D108BD9-81ED-4DB2-BD59-A6C34878D82A}">
-                    <a16:rowId xmlns="" xmlns:a16="http://schemas.microsoft.com/office/drawing/2014/main" val="10007"/>
+                    <a16:rowId xmlns:a16="http://schemas.microsoft.com/office/drawing/2014/main" xmlns="" val="10007"/>
                   </a:ext>
                 </a:extLst>
               </a:tr>
@@ -16334,7 +16448,7 @@
           <a:p>
             <a:fld id="{9B19E99B-5349-415A-8E56-8E989211A366}" type="datetime1">
               <a:rPr lang="en-US" smtClean="0"/>
-              <a:t>10/28/2018</a:t>
+              <a:t>10/29/2018</a:t>
             </a:fld>
             <a:endParaRPr lang="en-US"/>
           </a:p>
@@ -16396,6 +16510,13 @@
   <p:clrMapOvr>
     <a:masterClrMapping/>
   </p:clrMapOvr>
+  <p:timing>
+    <p:tnLst>
+      <p:par>
+        <p:cTn id="1" dur="indefinite" restart="never" nodeType="tmRoot"/>
+      </p:par>
+    </p:tnLst>
+  </p:timing>
 </p:sld>
 </file>
 
@@ -16505,7 +16626,7 @@
           <a:p>
             <a:fld id="{D753EFC8-4232-4598-94F6-94C0EBAFC469}" type="datetime1">
               <a:rPr lang="en-US" smtClean="0"/>
-              <a:t>10/28/2018</a:t>
+              <a:t>10/29/2018</a:t>
             </a:fld>
             <a:endParaRPr lang="en-US"/>
           </a:p>
@@ -16838,6 +16959,13 @@
   <p:clrMapOvr>
     <a:masterClrMapping/>
   </p:clrMapOvr>
+  <p:timing>
+    <p:tnLst>
+      <p:par>
+        <p:cTn id="1" dur="indefinite" restart="never" nodeType="tmRoot"/>
+      </p:par>
+    </p:tnLst>
+  </p:timing>
 </p:sld>
 </file>
 
@@ -16898,7 +17026,7 @@
           <a:p>
             <a:fld id="{D753EFC8-4232-4598-94F6-94C0EBAFC469}" type="datetime1">
               <a:rPr lang="en-US" smtClean="0"/>
-              <a:t>10/28/2018</a:t>
+              <a:t>10/29/2018</a:t>
             </a:fld>
             <a:endParaRPr lang="en-US"/>
           </a:p>
@@ -17239,6 +17367,13 @@
   <p:clrMapOvr>
     <a:masterClrMapping/>
   </p:clrMapOvr>
+  <p:timing>
+    <p:tnLst>
+      <p:par>
+        <p:cTn id="1" dur="indefinite" restart="never" nodeType="tmRoot"/>
+      </p:par>
+    </p:tnLst>
+  </p:timing>
 </p:sld>
 </file>
 
@@ -17299,7 +17434,7 @@
           <a:p>
             <a:fld id="{D753EFC8-4232-4598-94F6-94C0EBAFC469}" type="datetime1">
               <a:rPr lang="en-US" smtClean="0"/>
-              <a:t>10/28/2018</a:t>
+              <a:t>10/29/2018</a:t>
             </a:fld>
             <a:endParaRPr lang="en-US"/>
           </a:p>
@@ -17590,7 +17725,15 @@
             </a:r>
             <a:r>
               <a:rPr lang="en-US" sz="1600" dirty="0"/>
-              <a:t>Seasonal effect + Trend + Cyclical + </a:t>
+              <a:t>Seasonal effect + </a:t>
+            </a:r>
+            <a:r>
+              <a:rPr lang="en-US" sz="1600"/>
+              <a:t>Trend </a:t>
+            </a:r>
+            <a:r>
+              <a:rPr lang="en-US" sz="1600" smtClean="0"/>
+              <a:t>+ </a:t>
             </a:r>
             <a:r>
               <a:rPr lang="en-US" sz="1600" dirty="0" smtClean="0"/>
@@ -17682,20 +17825,16 @@
               <a:t>X </a:t>
             </a:r>
             <a:r>
-              <a:rPr lang="en-US" sz="1600" dirty="0"/>
+              <a:rPr lang="en-US" sz="1600"/>
               <a:t>Trend </a:t>
             </a:r>
             <a:r>
+              <a:rPr lang="en-US" sz="1600" smtClean="0"/>
+              <a:t>X </a:t>
+            </a:r>
+            <a:r>
               <a:rPr lang="en-US" sz="1600" dirty="0" smtClean="0"/>
-              <a:t>X </a:t>
-            </a:r>
-            <a:r>
-              <a:rPr lang="en-US" sz="1600" dirty="0"/>
-              <a:t>Cyclical </a:t>
-            </a:r>
-            <a:r>
-              <a:rPr lang="en-US" sz="1600" dirty="0" smtClean="0"/>
-              <a:t>X Residual</a:t>
+              <a:t>Residual</a:t>
             </a:r>
           </a:p>
           <a:p>
@@ -17739,6 +17878,13 @@
   <p:clrMapOvr>
     <a:masterClrMapping/>
   </p:clrMapOvr>
+  <p:timing>
+    <p:tnLst>
+      <p:par>
+        <p:cTn id="1" dur="indefinite" restart="never" nodeType="tmRoot"/>
+      </p:par>
+    </p:tnLst>
+  </p:timing>
 </p:sld>
 </file>
 
@@ -17799,7 +17945,7 @@
           <a:p>
             <a:fld id="{D753EFC8-4232-4598-94F6-94C0EBAFC469}" type="datetime1">
               <a:rPr lang="en-US" smtClean="0"/>
-              <a:t>10/28/2018</a:t>
+              <a:t>10/29/2018</a:t>
             </a:fld>
             <a:endParaRPr lang="en-US"/>
           </a:p>
@@ -18124,6 +18270,13 @@
   <p:clrMapOvr>
     <a:masterClrMapping/>
   </p:clrMapOvr>
+  <p:timing>
+    <p:tnLst>
+      <p:par>
+        <p:cTn id="1" dur="indefinite" restart="never" nodeType="tmRoot"/>
+      </p:par>
+    </p:tnLst>
+  </p:timing>
 </p:sld>
 </file>
 
@@ -18149,7 +18302,7 @@
           <p:cNvPr id="2" name="Date Placeholder 1">
             <a:extLst>
               <a:ext uri="{FF2B5EF4-FFF2-40B4-BE49-F238E27FC236}">
-                <a16:creationId xmlns="" xmlns:a16="http://schemas.microsoft.com/office/drawing/2014/main" id="{3FE42EE3-9848-4091-AB32-9CD1544500AA}"/>
+                <a16:creationId xmlns:a16="http://schemas.microsoft.com/office/drawing/2014/main" xmlns="" id="{3FE42EE3-9848-4091-AB32-9CD1544500AA}"/>
               </a:ext>
             </a:extLst>
           </p:cNvPr>
@@ -18167,7 +18320,7 @@
           <a:p>
             <a:fld id="{6700A58B-DD98-43D0-B791-721480A02982}" type="datetime1">
               <a:rPr lang="en-US" smtClean="0"/>
-              <a:t>10/28/2018</a:t>
+              <a:t>10/29/2018</a:t>
             </a:fld>
             <a:endParaRPr lang="en-US"/>
           </a:p>
@@ -18178,7 +18331,7 @@
           <p:cNvPr id="3" name="Title 2">
             <a:extLst>
               <a:ext uri="{FF2B5EF4-FFF2-40B4-BE49-F238E27FC236}">
-                <a16:creationId xmlns="" xmlns:a16="http://schemas.microsoft.com/office/drawing/2014/main" id="{75CF0D48-1409-4FA8-BC35-CEE75BFEF286}"/>
+                <a16:creationId xmlns:a16="http://schemas.microsoft.com/office/drawing/2014/main" xmlns="" id="{75CF0D48-1409-4FA8-BC35-CEE75BFEF286}"/>
               </a:ext>
             </a:extLst>
           </p:cNvPr>
@@ -18211,7 +18364,7 @@
           <p:cNvPr id="4" name="Slide Number Placeholder 3">
             <a:extLst>
               <a:ext uri="{FF2B5EF4-FFF2-40B4-BE49-F238E27FC236}">
-                <a16:creationId xmlns="" xmlns:a16="http://schemas.microsoft.com/office/drawing/2014/main" id="{2236DEF1-B7DD-43A0-BF17-9242EB83DB1B}"/>
+                <a16:creationId xmlns:a16="http://schemas.microsoft.com/office/drawing/2014/main" xmlns="" id="{2236DEF1-B7DD-43A0-BF17-9242EB83DB1B}"/>
               </a:ext>
             </a:extLst>
           </p:cNvPr>
@@ -18240,7 +18393,7 @@
           <p:cNvPr id="5" name="Footer Placeholder 4">
             <a:extLst>
               <a:ext uri="{FF2B5EF4-FFF2-40B4-BE49-F238E27FC236}">
-                <a16:creationId xmlns="" xmlns:a16="http://schemas.microsoft.com/office/drawing/2014/main" id="{08728560-6A4E-47D2-9335-23EFE2B9303A}"/>
+                <a16:creationId xmlns:a16="http://schemas.microsoft.com/office/drawing/2014/main" xmlns="" id="{08728560-6A4E-47D2-9335-23EFE2B9303A}"/>
               </a:ext>
             </a:extLst>
           </p:cNvPr>
@@ -18269,7 +18422,7 @@
           <p:cNvPr id="6" name="Rectangle 5">
             <a:extLst>
               <a:ext uri="{FF2B5EF4-FFF2-40B4-BE49-F238E27FC236}">
-                <a16:creationId xmlns="" xmlns:a16="http://schemas.microsoft.com/office/drawing/2014/main" id="{7AAD1D07-F801-42E5-819D-E8E714D70829}"/>
+                <a16:creationId xmlns:a16="http://schemas.microsoft.com/office/drawing/2014/main" xmlns="" id="{7AAD1D07-F801-42E5-819D-E8E714D70829}"/>
               </a:ext>
             </a:extLst>
           </p:cNvPr>
@@ -18318,7 +18471,7 @@
           <p:cNvPr id="8" name="TextBox 7">
             <a:extLst>
               <a:ext uri="{FF2B5EF4-FFF2-40B4-BE49-F238E27FC236}">
-                <a16:creationId xmlns="" xmlns:a16="http://schemas.microsoft.com/office/drawing/2014/main" id="{92385DCF-E141-4D39-B06E-9C9C5AF21B3D}"/>
+                <a16:creationId xmlns:a16="http://schemas.microsoft.com/office/drawing/2014/main" xmlns="" id="{92385DCF-E141-4D39-B06E-9C9C5AF21B3D}"/>
               </a:ext>
             </a:extLst>
           </p:cNvPr>
@@ -18567,6 +18720,13 @@
   <p:clrMapOvr>
     <a:masterClrMapping/>
   </p:clrMapOvr>
+  <p:timing>
+    <p:tnLst>
+      <p:par>
+        <p:cTn id="1" dur="indefinite" restart="never" nodeType="tmRoot"/>
+      </p:par>
+    </p:tnLst>
+  </p:timing>
 </p:sld>
 </file>
 
@@ -18627,7 +18787,7 @@
           <a:p>
             <a:fld id="{D753EFC8-4232-4598-94F6-94C0EBAFC469}" type="datetime1">
               <a:rPr lang="en-US" smtClean="0"/>
-              <a:t>10/28/2018</a:t>
+              <a:t>10/29/2018</a:t>
             </a:fld>
             <a:endParaRPr lang="en-US"/>
           </a:p>
@@ -18890,7 +19050,7 @@
           <a:p>
             <a:fld id="{D753EFC8-4232-4598-94F6-94C0EBAFC469}" type="datetime1">
               <a:rPr lang="en-US" smtClean="0"/>
-              <a:t>10/28/2018</a:t>
+              <a:t>10/29/2018</a:t>
             </a:fld>
             <a:endParaRPr lang="en-US"/>
           </a:p>
@@ -19023,21 +19183,21 @@
                 <a:gridCol w="1242805">
                   <a:extLst>
                     <a:ext uri="{9D8B030D-6E8A-4147-A177-3AD203B41FA5}">
-                      <a16:colId xmlns="" xmlns:a16="http://schemas.microsoft.com/office/drawing/2014/main" val="20000"/>
+                      <a16:colId xmlns:a16="http://schemas.microsoft.com/office/drawing/2014/main" xmlns="" val="20000"/>
                     </a:ext>
                   </a:extLst>
                 </a:gridCol>
                 <a:gridCol w="861296">
                   <a:extLst>
                     <a:ext uri="{9D8B030D-6E8A-4147-A177-3AD203B41FA5}">
-                      <a16:colId xmlns="" xmlns:a16="http://schemas.microsoft.com/office/drawing/2014/main" val="20001"/>
+                      <a16:colId xmlns:a16="http://schemas.microsoft.com/office/drawing/2014/main" xmlns="" val="20001"/>
                     </a:ext>
                   </a:extLst>
                 </a:gridCol>
                 <a:gridCol w="5811174">
                   <a:extLst>
                     <a:ext uri="{9D8B030D-6E8A-4147-A177-3AD203B41FA5}">
-                      <a16:colId xmlns="" xmlns:a16="http://schemas.microsoft.com/office/drawing/2014/main" val="20002"/>
+                      <a16:colId xmlns:a16="http://schemas.microsoft.com/office/drawing/2014/main" xmlns="" val="20002"/>
                     </a:ext>
                   </a:extLst>
                 </a:gridCol>
@@ -19086,7 +19246,7 @@
                 </a:tc>
                 <a:extLst>
                   <a:ext uri="{0D108BD9-81ED-4DB2-BD59-A6C34878D82A}">
-                    <a16:rowId xmlns="" xmlns:a16="http://schemas.microsoft.com/office/drawing/2014/main" val="10000"/>
+                    <a16:rowId xmlns:a16="http://schemas.microsoft.com/office/drawing/2014/main" xmlns="" val="10000"/>
                   </a:ext>
                 </a:extLst>
               </a:tr>
@@ -19151,7 +19311,7 @@
                 </a:tc>
                 <a:extLst>
                   <a:ext uri="{0D108BD9-81ED-4DB2-BD59-A6C34878D82A}">
-                    <a16:rowId xmlns="" xmlns:a16="http://schemas.microsoft.com/office/drawing/2014/main" val="10001"/>
+                    <a16:rowId xmlns:a16="http://schemas.microsoft.com/office/drawing/2014/main" xmlns="" val="10001"/>
                   </a:ext>
                 </a:extLst>
               </a:tr>
@@ -19208,7 +19368,7 @@
                 </a:tc>
                 <a:extLst>
                   <a:ext uri="{0D108BD9-81ED-4DB2-BD59-A6C34878D82A}">
-                    <a16:rowId xmlns="" xmlns:a16="http://schemas.microsoft.com/office/drawing/2014/main" val="10002"/>
+                    <a16:rowId xmlns:a16="http://schemas.microsoft.com/office/drawing/2014/main" xmlns="" val="10002"/>
                   </a:ext>
                 </a:extLst>
               </a:tr>
@@ -19251,7 +19411,7 @@
                 </a:tc>
                 <a:extLst>
                   <a:ext uri="{0D108BD9-81ED-4DB2-BD59-A6C34878D82A}">
-                    <a16:rowId xmlns="" xmlns:a16="http://schemas.microsoft.com/office/drawing/2014/main" val="10003"/>
+                    <a16:rowId xmlns:a16="http://schemas.microsoft.com/office/drawing/2014/main" xmlns="" val="10003"/>
                   </a:ext>
                 </a:extLst>
               </a:tr>
@@ -19298,7 +19458,7 @@
                 </a:tc>
                 <a:extLst>
                   <a:ext uri="{0D108BD9-81ED-4DB2-BD59-A6C34878D82A}">
-                    <a16:rowId xmlns="" xmlns:a16="http://schemas.microsoft.com/office/drawing/2014/main" val="10004"/>
+                    <a16:rowId xmlns:a16="http://schemas.microsoft.com/office/drawing/2014/main" xmlns="" val="10004"/>
                   </a:ext>
                 </a:extLst>
               </a:tr>
@@ -19341,7 +19501,7 @@
                 </a:tc>
                 <a:extLst>
                   <a:ext uri="{0D108BD9-81ED-4DB2-BD59-A6C34878D82A}">
-                    <a16:rowId xmlns="" xmlns:a16="http://schemas.microsoft.com/office/drawing/2014/main" val="10005"/>
+                    <a16:rowId xmlns:a16="http://schemas.microsoft.com/office/drawing/2014/main" xmlns="" val="10005"/>
                   </a:ext>
                 </a:extLst>
               </a:tr>
@@ -19380,7 +19540,7 @@
                 </a:tc>
                 <a:extLst>
                   <a:ext uri="{0D108BD9-81ED-4DB2-BD59-A6C34878D82A}">
-                    <a16:rowId xmlns="" xmlns:a16="http://schemas.microsoft.com/office/drawing/2014/main" val="10006"/>
+                    <a16:rowId xmlns:a16="http://schemas.microsoft.com/office/drawing/2014/main" xmlns="" val="10006"/>
                   </a:ext>
                 </a:extLst>
               </a:tr>
@@ -19419,7 +19579,7 @@
                 </a:tc>
                 <a:extLst>
                   <a:ext uri="{0D108BD9-81ED-4DB2-BD59-A6C34878D82A}">
-                    <a16:rowId xmlns="" xmlns:a16="http://schemas.microsoft.com/office/drawing/2014/main" val="10007"/>
+                    <a16:rowId xmlns:a16="http://schemas.microsoft.com/office/drawing/2014/main" xmlns="" val="10007"/>
                   </a:ext>
                 </a:extLst>
               </a:tr>
@@ -19444,7 +19604,7 @@
           <a:p>
             <a:fld id="{9B19E99B-5349-415A-8E56-8E989211A366}" type="datetime1">
               <a:rPr lang="en-US" smtClean="0"/>
-              <a:t>10/28/2018</a:t>
+              <a:t>10/29/2018</a:t>
             </a:fld>
             <a:endParaRPr lang="en-US"/>
           </a:p>
@@ -19566,7 +19726,7 @@
           <a:p>
             <a:fld id="{D753EFC8-4232-4598-94F6-94C0EBAFC469}" type="datetime1">
               <a:rPr lang="en-US" smtClean="0"/>
-              <a:t>10/28/2018</a:t>
+              <a:t>10/29/2018</a:t>
             </a:fld>
             <a:endParaRPr lang="en-US"/>
           </a:p>
@@ -20276,7 +20436,7 @@
           <a:p>
             <a:fld id="{D753EFC8-4232-4598-94F6-94C0EBAFC469}" type="datetime1">
               <a:rPr lang="en-US" smtClean="0"/>
-              <a:t>10/28/2018</a:t>
+              <a:t>10/29/2018</a:t>
             </a:fld>
             <a:endParaRPr lang="en-US"/>
           </a:p>
@@ -21219,7 +21379,7 @@
           <a:p>
             <a:fld id="{D753EFC8-4232-4598-94F6-94C0EBAFC469}" type="datetime1">
               <a:rPr lang="en-US" smtClean="0"/>
-              <a:t>10/28/2018</a:t>
+              <a:t>10/29/2018</a:t>
             </a:fld>
             <a:endParaRPr lang="en-US"/>
           </a:p>
@@ -22207,7 +22367,7 @@
           <a:p>
             <a:fld id="{D753EFC8-4232-4598-94F6-94C0EBAFC469}" type="datetime1">
               <a:rPr lang="en-US" smtClean="0"/>
-              <a:t>10/28/2018</a:t>
+              <a:t>10/29/2018</a:t>
             </a:fld>
             <a:endParaRPr lang="en-US"/>
           </a:p>
@@ -22521,7 +22681,7 @@
           <a:p>
             <a:fld id="{D753EFC8-4232-4598-94F6-94C0EBAFC469}" type="datetime1">
               <a:rPr lang="en-US" smtClean="0"/>
-              <a:t>10/28/2018</a:t>
+              <a:t>10/29/2018</a:t>
             </a:fld>
             <a:endParaRPr lang="en-US"/>
           </a:p>
@@ -22665,7 +22825,7 @@
           <p:cNvPr id="2" name="Date Placeholder 1">
             <a:extLst>
               <a:ext uri="{FF2B5EF4-FFF2-40B4-BE49-F238E27FC236}">
-                <a16:creationId xmlns="" xmlns:a16="http://schemas.microsoft.com/office/drawing/2014/main" id="{3FE42EE3-9848-4091-AB32-9CD1544500AA}"/>
+                <a16:creationId xmlns:a16="http://schemas.microsoft.com/office/drawing/2014/main" xmlns="" id="{3FE42EE3-9848-4091-AB32-9CD1544500AA}"/>
               </a:ext>
             </a:extLst>
           </p:cNvPr>
@@ -22683,7 +22843,7 @@
           <a:p>
             <a:fld id="{6700A58B-DD98-43D0-B791-721480A02982}" type="datetime1">
               <a:rPr lang="en-US" smtClean="0"/>
-              <a:t>10/28/2018</a:t>
+              <a:t>10/29/2018</a:t>
             </a:fld>
             <a:endParaRPr lang="en-US"/>
           </a:p>
@@ -22694,7 +22854,7 @@
           <p:cNvPr id="3" name="Title 2">
             <a:extLst>
               <a:ext uri="{FF2B5EF4-FFF2-40B4-BE49-F238E27FC236}">
-                <a16:creationId xmlns="" xmlns:a16="http://schemas.microsoft.com/office/drawing/2014/main" id="{75CF0D48-1409-4FA8-BC35-CEE75BFEF286}"/>
+                <a16:creationId xmlns:a16="http://schemas.microsoft.com/office/drawing/2014/main" xmlns="" id="{75CF0D48-1409-4FA8-BC35-CEE75BFEF286}"/>
               </a:ext>
             </a:extLst>
           </p:cNvPr>
@@ -22727,7 +22887,7 @@
           <p:cNvPr id="4" name="Slide Number Placeholder 3">
             <a:extLst>
               <a:ext uri="{FF2B5EF4-FFF2-40B4-BE49-F238E27FC236}">
-                <a16:creationId xmlns="" xmlns:a16="http://schemas.microsoft.com/office/drawing/2014/main" id="{2236DEF1-B7DD-43A0-BF17-9242EB83DB1B}"/>
+                <a16:creationId xmlns:a16="http://schemas.microsoft.com/office/drawing/2014/main" xmlns="" id="{2236DEF1-B7DD-43A0-BF17-9242EB83DB1B}"/>
               </a:ext>
             </a:extLst>
           </p:cNvPr>
@@ -22756,7 +22916,7 @@
           <p:cNvPr id="5" name="Footer Placeholder 4">
             <a:extLst>
               <a:ext uri="{FF2B5EF4-FFF2-40B4-BE49-F238E27FC236}">
-                <a16:creationId xmlns="" xmlns:a16="http://schemas.microsoft.com/office/drawing/2014/main" id="{08728560-6A4E-47D2-9335-23EFE2B9303A}"/>
+                <a16:creationId xmlns:a16="http://schemas.microsoft.com/office/drawing/2014/main" xmlns="" id="{08728560-6A4E-47D2-9335-23EFE2B9303A}"/>
               </a:ext>
             </a:extLst>
           </p:cNvPr>
@@ -22785,7 +22945,7 @@
           <p:cNvPr id="6" name="Rectangle 5">
             <a:extLst>
               <a:ext uri="{FF2B5EF4-FFF2-40B4-BE49-F238E27FC236}">
-                <a16:creationId xmlns="" xmlns:a16="http://schemas.microsoft.com/office/drawing/2014/main" id="{7AAD1D07-F801-42E5-819D-E8E714D70829}"/>
+                <a16:creationId xmlns:a16="http://schemas.microsoft.com/office/drawing/2014/main" xmlns="" id="{7AAD1D07-F801-42E5-819D-E8E714D70829}"/>
               </a:ext>
             </a:extLst>
           </p:cNvPr>
@@ -22835,7 +22995,7 @@
           <p:cNvPr id="8" name="TextBox 7">
             <a:extLst>
               <a:ext uri="{FF2B5EF4-FFF2-40B4-BE49-F238E27FC236}">
-                <a16:creationId xmlns="" xmlns:a16="http://schemas.microsoft.com/office/drawing/2014/main" id="{92385DCF-E141-4D39-B06E-9C9C5AF21B3D}"/>
+                <a16:creationId xmlns:a16="http://schemas.microsoft.com/office/drawing/2014/main" xmlns="" id="{92385DCF-E141-4D39-B06E-9C9C5AF21B3D}"/>
               </a:ext>
             </a:extLst>
           </p:cNvPr>
@@ -23069,6 +23229,13 @@
   <p:clrMapOvr>
     <a:masterClrMapping/>
   </p:clrMapOvr>
+  <p:timing>
+    <p:tnLst>
+      <p:par>
+        <p:cTn id="1" dur="indefinite" restart="never" nodeType="tmRoot"/>
+      </p:par>
+    </p:tnLst>
+  </p:timing>
 </p:sld>
 </file>
 
@@ -23110,7 +23277,7 @@
           <a:graphicData uri="http://schemas.openxmlformats.org/presentationml/2006/ole">
             <mc:AlternateContent xmlns:mc="http://schemas.openxmlformats.org/markup-compatibility/2006">
               <mc:Choice xmlns:v="urn:schemas-microsoft-com:vml" Requires="v">
-                <p:oleObj spid="_x0000_s13356" name="think-cell Slide" r:id="rId5" imgW="270" imgH="270" progId="TCLayout.ActiveDocument.1">
+                <p:oleObj spid="_x0000_s13357" name="think-cell Slide" r:id="rId5" imgW="270" imgH="270" progId="TCLayout.ActiveDocument.1">
                   <p:embed/>
                 </p:oleObj>
               </mc:Choice>
@@ -23863,6 +24030,13 @@
   <p:clrMapOvr>
     <a:masterClrMapping/>
   </p:clrMapOvr>
+  <p:timing>
+    <p:tnLst>
+      <p:par>
+        <p:cTn id="1" dur="indefinite" restart="never" nodeType="tmRoot"/>
+      </p:par>
+    </p:tnLst>
+  </p:timing>
 </p:sld>
 </file>
 
@@ -23888,7 +24062,7 @@
           <p:cNvPr id="2" name="Date Placeholder 1">
             <a:extLst>
               <a:ext uri="{FF2B5EF4-FFF2-40B4-BE49-F238E27FC236}">
-                <a16:creationId xmlns="" xmlns:a16="http://schemas.microsoft.com/office/drawing/2014/main" id="{B1BF93EB-721E-440E-B1E4-0F3176DDC335}"/>
+                <a16:creationId xmlns:a16="http://schemas.microsoft.com/office/drawing/2014/main" xmlns="" id="{B1BF93EB-721E-440E-B1E4-0F3176DDC335}"/>
               </a:ext>
             </a:extLst>
           </p:cNvPr>
@@ -23906,7 +24080,7 @@
           <a:p>
             <a:fld id="{6700A58B-DD98-43D0-B791-721480A02982}" type="datetime1">
               <a:rPr lang="en-US" smtClean="0"/>
-              <a:t>10/28/2018</a:t>
+              <a:t>10/29/2018</a:t>
             </a:fld>
             <a:endParaRPr lang="en-US"/>
           </a:p>
@@ -23917,7 +24091,7 @@
           <p:cNvPr id="3" name="Title 2">
             <a:extLst>
               <a:ext uri="{FF2B5EF4-FFF2-40B4-BE49-F238E27FC236}">
-                <a16:creationId xmlns="" xmlns:a16="http://schemas.microsoft.com/office/drawing/2014/main" id="{7EABDFEA-2E8D-4355-A525-5076AD5FDFD4}"/>
+                <a16:creationId xmlns:a16="http://schemas.microsoft.com/office/drawing/2014/main" xmlns="" id="{7EABDFEA-2E8D-4355-A525-5076AD5FDFD4}"/>
               </a:ext>
             </a:extLst>
           </p:cNvPr>
@@ -23945,7 +24119,7 @@
           <p:cNvPr id="4" name="Slide Number Placeholder 3">
             <a:extLst>
               <a:ext uri="{FF2B5EF4-FFF2-40B4-BE49-F238E27FC236}">
-                <a16:creationId xmlns="" xmlns:a16="http://schemas.microsoft.com/office/drawing/2014/main" id="{FE70CA59-1C1D-4B4E-8CB0-3562A01BFC26}"/>
+                <a16:creationId xmlns:a16="http://schemas.microsoft.com/office/drawing/2014/main" xmlns="" id="{FE70CA59-1C1D-4B4E-8CB0-3562A01BFC26}"/>
               </a:ext>
             </a:extLst>
           </p:cNvPr>
@@ -23974,7 +24148,7 @@
           <p:cNvPr id="5" name="Footer Placeholder 4">
             <a:extLst>
               <a:ext uri="{FF2B5EF4-FFF2-40B4-BE49-F238E27FC236}">
-                <a16:creationId xmlns="" xmlns:a16="http://schemas.microsoft.com/office/drawing/2014/main" id="{9AFC84E1-D2CB-4F12-96DE-2B79FDACA3AA}"/>
+                <a16:creationId xmlns:a16="http://schemas.microsoft.com/office/drawing/2014/main" xmlns="" id="{9AFC84E1-D2CB-4F12-96DE-2B79FDACA3AA}"/>
               </a:ext>
             </a:extLst>
           </p:cNvPr>
@@ -24003,7 +24177,7 @@
           <p:cNvPr id="6" name="Content Placeholder 2">
             <a:extLst>
               <a:ext uri="{FF2B5EF4-FFF2-40B4-BE49-F238E27FC236}">
-                <a16:creationId xmlns="" xmlns:a16="http://schemas.microsoft.com/office/drawing/2014/main" id="{7BED4843-F5A4-48C6-A2BC-D37A038D93CD}"/>
+                <a16:creationId xmlns:a16="http://schemas.microsoft.com/office/drawing/2014/main" xmlns="" id="{7BED4843-F5A4-48C6-A2BC-D37A038D93CD}"/>
               </a:ext>
             </a:extLst>
           </p:cNvPr>
@@ -24402,6 +24576,13 @@
   <p:clrMapOvr>
     <a:masterClrMapping/>
   </p:clrMapOvr>
+  <p:timing>
+    <p:tnLst>
+      <p:par>
+        <p:cTn id="1" dur="indefinite" restart="never" nodeType="tmRoot"/>
+      </p:par>
+    </p:tnLst>
+  </p:timing>
 </p:sld>
 </file>
 
@@ -24427,7 +24608,7 @@
           <p:cNvPr id="2" name="Date Placeholder 1">
             <a:extLst>
               <a:ext uri="{FF2B5EF4-FFF2-40B4-BE49-F238E27FC236}">
-                <a16:creationId xmlns="" xmlns:a16="http://schemas.microsoft.com/office/drawing/2014/main" id="{5F2C3887-5370-461B-9723-FA8FB02B541C}"/>
+                <a16:creationId xmlns:a16="http://schemas.microsoft.com/office/drawing/2014/main" xmlns="" id="{5F2C3887-5370-461B-9723-FA8FB02B541C}"/>
               </a:ext>
             </a:extLst>
           </p:cNvPr>
@@ -24445,7 +24626,7 @@
           <a:p>
             <a:fld id="{6700A58B-DD98-43D0-B791-721480A02982}" type="datetime1">
               <a:rPr lang="en-US" smtClean="0"/>
-              <a:t>10/28/2018</a:t>
+              <a:t>10/29/2018</a:t>
             </a:fld>
             <a:endParaRPr lang="en-US"/>
           </a:p>
@@ -24456,7 +24637,7 @@
           <p:cNvPr id="3" name="Title 2">
             <a:extLst>
               <a:ext uri="{FF2B5EF4-FFF2-40B4-BE49-F238E27FC236}">
-                <a16:creationId xmlns="" xmlns:a16="http://schemas.microsoft.com/office/drawing/2014/main" id="{79452733-36AC-40C0-A10C-890FD418D562}"/>
+                <a16:creationId xmlns:a16="http://schemas.microsoft.com/office/drawing/2014/main" xmlns="" id="{79452733-36AC-40C0-A10C-890FD418D562}"/>
               </a:ext>
             </a:extLst>
           </p:cNvPr>
@@ -24485,7 +24666,7 @@
           <p:cNvPr id="4" name="Slide Number Placeholder 3">
             <a:extLst>
               <a:ext uri="{FF2B5EF4-FFF2-40B4-BE49-F238E27FC236}">
-                <a16:creationId xmlns="" xmlns:a16="http://schemas.microsoft.com/office/drawing/2014/main" id="{F04AF1B6-DEDE-4ECF-96D8-2BA98C5E8A09}"/>
+                <a16:creationId xmlns:a16="http://schemas.microsoft.com/office/drawing/2014/main" xmlns="" id="{F04AF1B6-DEDE-4ECF-96D8-2BA98C5E8A09}"/>
               </a:ext>
             </a:extLst>
           </p:cNvPr>
@@ -24514,7 +24695,7 @@
           <p:cNvPr id="5" name="Footer Placeholder 4">
             <a:extLst>
               <a:ext uri="{FF2B5EF4-FFF2-40B4-BE49-F238E27FC236}">
-                <a16:creationId xmlns="" xmlns:a16="http://schemas.microsoft.com/office/drawing/2014/main" id="{3E3C4817-070D-4782-935E-C73E380E19C6}"/>
+                <a16:creationId xmlns:a16="http://schemas.microsoft.com/office/drawing/2014/main" xmlns="" id="{3E3C4817-070D-4782-935E-C73E380E19C6}"/>
               </a:ext>
             </a:extLst>
           </p:cNvPr>
@@ -24543,7 +24724,7 @@
           <p:cNvPr id="6" name="Content Placeholder 2">
             <a:extLst>
               <a:ext uri="{FF2B5EF4-FFF2-40B4-BE49-F238E27FC236}">
-                <a16:creationId xmlns="" xmlns:a16="http://schemas.microsoft.com/office/drawing/2014/main" id="{4523FFBD-8391-4A87-80CE-BABAEAA54264}"/>
+                <a16:creationId xmlns:a16="http://schemas.microsoft.com/office/drawing/2014/main" xmlns="" id="{4523FFBD-8391-4A87-80CE-BABAEAA54264}"/>
               </a:ext>
             </a:extLst>
           </p:cNvPr>
@@ -24852,7 +25033,7 @@
           <p:cNvPr id="2" name="Date Placeholder 1">
             <a:extLst>
               <a:ext uri="{FF2B5EF4-FFF2-40B4-BE49-F238E27FC236}">
-                <a16:creationId xmlns="" xmlns:a16="http://schemas.microsoft.com/office/drawing/2014/main" id="{1446CF81-18DA-4882-8542-7FA528C6881D}"/>
+                <a16:creationId xmlns:a16="http://schemas.microsoft.com/office/drawing/2014/main" xmlns="" id="{1446CF81-18DA-4882-8542-7FA528C6881D}"/>
               </a:ext>
             </a:extLst>
           </p:cNvPr>
@@ -24870,7 +25051,7 @@
           <a:p>
             <a:fld id="{6700A58B-DD98-43D0-B791-721480A02982}" type="datetime1">
               <a:rPr lang="en-US" smtClean="0"/>
-              <a:t>10/28/2018</a:t>
+              <a:t>10/29/2018</a:t>
             </a:fld>
             <a:endParaRPr lang="en-US"/>
           </a:p>
@@ -24881,7 +25062,7 @@
           <p:cNvPr id="3" name="Title 2">
             <a:extLst>
               <a:ext uri="{FF2B5EF4-FFF2-40B4-BE49-F238E27FC236}">
-                <a16:creationId xmlns="" xmlns:a16="http://schemas.microsoft.com/office/drawing/2014/main" id="{614E3173-1F1E-4CF3-A763-737C0F4A4EA7}"/>
+                <a16:creationId xmlns:a16="http://schemas.microsoft.com/office/drawing/2014/main" xmlns="" id="{614E3173-1F1E-4CF3-A763-737C0F4A4EA7}"/>
               </a:ext>
             </a:extLst>
           </p:cNvPr>
@@ -24914,7 +25095,7 @@
           <p:cNvPr id="4" name="Slide Number Placeholder 3">
             <a:extLst>
               <a:ext uri="{FF2B5EF4-FFF2-40B4-BE49-F238E27FC236}">
-                <a16:creationId xmlns="" xmlns:a16="http://schemas.microsoft.com/office/drawing/2014/main" id="{C84D43DA-DA54-4A2F-AFA1-93EE114DE9F2}"/>
+                <a16:creationId xmlns:a16="http://schemas.microsoft.com/office/drawing/2014/main" xmlns="" id="{C84D43DA-DA54-4A2F-AFA1-93EE114DE9F2}"/>
               </a:ext>
             </a:extLst>
           </p:cNvPr>
@@ -24943,7 +25124,7 @@
           <p:cNvPr id="5" name="Footer Placeholder 4">
             <a:extLst>
               <a:ext uri="{FF2B5EF4-FFF2-40B4-BE49-F238E27FC236}">
-                <a16:creationId xmlns="" xmlns:a16="http://schemas.microsoft.com/office/drawing/2014/main" id="{EE31643D-3082-4F21-9828-946838B0DBFB}"/>
+                <a16:creationId xmlns:a16="http://schemas.microsoft.com/office/drawing/2014/main" xmlns="" id="{EE31643D-3082-4F21-9828-946838B0DBFB}"/>
               </a:ext>
             </a:extLst>
           </p:cNvPr>
@@ -24972,7 +25153,7 @@
           <p:cNvPr id="7" name="TextBox 6">
             <a:extLst>
               <a:ext uri="{FF2B5EF4-FFF2-40B4-BE49-F238E27FC236}">
-                <a16:creationId xmlns="" xmlns:a16="http://schemas.microsoft.com/office/drawing/2014/main" id="{709878E9-7B9E-4E44-B365-5CC9BC94906B}"/>
+                <a16:creationId xmlns:a16="http://schemas.microsoft.com/office/drawing/2014/main" xmlns="" id="{709878E9-7B9E-4E44-B365-5CC9BC94906B}"/>
               </a:ext>
             </a:extLst>
           </p:cNvPr>
@@ -25045,7 +25226,7 @@
           <p:cNvPr id="6" name="Picture 5">
             <a:extLst>
               <a:ext uri="{FF2B5EF4-FFF2-40B4-BE49-F238E27FC236}">
-                <a16:creationId xmlns="" xmlns:a16="http://schemas.microsoft.com/office/drawing/2014/main" id="{4D9F30B6-F781-4F9F-A682-E0BD1E45FE16}"/>
+                <a16:creationId xmlns:a16="http://schemas.microsoft.com/office/drawing/2014/main" xmlns="" id="{4D9F30B6-F781-4F9F-A682-E0BD1E45FE16}"/>
               </a:ext>
             </a:extLst>
           </p:cNvPr>

</xml_diff>